<commit_message>
update multiple sri hashes
</commit_message>
<xml_diff>
--- a/slide-deck.pptx
+++ b/slide-deck.pptx
@@ -11,7 +11,7 @@
     <p:sldId id="265" r:id="rId2"/>
     <p:sldId id="268" r:id="rId3"/>
     <p:sldId id="270" r:id="rId4"/>
-    <p:sldId id="271" r:id="rId5"/>
+    <p:sldId id="278" r:id="rId5"/>
     <p:sldId id="272" r:id="rId6"/>
     <p:sldId id="273" r:id="rId7"/>
     <p:sldId id="275" r:id="rId8"/>
@@ -126,7 +126,7 @@
 <file path=ppt/revisionInfo.xml><?xml version="1.0" encoding="utf-8"?>
 <p1510:revInfo xmlns:a="http://schemas.openxmlformats.org/drawingml/2006/main" xmlns:r="http://schemas.openxmlformats.org/officeDocument/2006/relationships" xmlns:p1510="http://schemas.microsoft.com/office/powerpoint/2015/10/main">
   <p1510:revLst>
-    <p1510:client id="{33B8D583-0499-42A2-82A3-3885EDF220E9}" v="18" dt="2020-09-01T01:39:20.830"/>
+    <p1510:client id="{33B8D583-0499-42A2-82A3-3885EDF220E9}" v="20" dt="2020-09-03T01:56:25.888"/>
   </p1510:revLst>
 </p1510:revInfo>
 </file>
@@ -136,7 +136,7 @@
   <pc:docChgLst>
     <pc:chgData name="Shao Yee Ng" userId="0aa19361c50ab943" providerId="LiveId" clId="{33B8D583-0499-42A2-82A3-3885EDF220E9}"/>
     <pc:docChg chg="custSel mod addSld delSld modSld">
-      <pc:chgData name="Shao Yee Ng" userId="0aa19361c50ab943" providerId="LiveId" clId="{33B8D583-0499-42A2-82A3-3885EDF220E9}" dt="2020-09-01T10:59:56.979" v="5513" actId="20577"/>
+      <pc:chgData name="Shao Yee Ng" userId="0aa19361c50ab943" providerId="LiveId" clId="{33B8D583-0499-42A2-82A3-3885EDF220E9}" dt="2020-09-03T01:56:40.308" v="5531" actId="47"/>
       <pc:docMkLst>
         <pc:docMk/>
       </pc:docMkLst>
@@ -220,7 +220,7 @@
         </pc:sldMkLst>
       </pc:sldChg>
       <pc:sldChg chg="modSp new mod modNotesTx">
-        <pc:chgData name="Shao Yee Ng" userId="0aa19361c50ab943" providerId="LiveId" clId="{33B8D583-0499-42A2-82A3-3885EDF220E9}" dt="2020-09-01T10:59:56.979" v="5513" actId="20577"/>
+        <pc:chgData name="Shao Yee Ng" userId="0aa19361c50ab943" providerId="LiveId" clId="{33B8D583-0499-42A2-82A3-3885EDF220E9}" dt="2020-09-03T01:26:29.894" v="5514" actId="20577"/>
         <pc:sldMkLst>
           <pc:docMk/>
           <pc:sldMk cId="3170187823" sldId="265"/>
@@ -257,7 +257,7 @@
         </pc:sldMkLst>
       </pc:sldChg>
       <pc:sldChg chg="addSp delSp modSp new mod setBg modNotesTx">
-        <pc:chgData name="Shao Yee Ng" userId="0aa19361c50ab943" providerId="LiveId" clId="{33B8D583-0499-42A2-82A3-3885EDF220E9}" dt="2020-09-01T02:15:53.318" v="2447" actId="20577"/>
+        <pc:chgData name="Shao Yee Ng" userId="0aa19361c50ab943" providerId="LiveId" clId="{33B8D583-0499-42A2-82A3-3885EDF220E9}" dt="2020-09-03T01:26:32.291" v="5515" actId="20577"/>
         <pc:sldMkLst>
           <pc:docMk/>
           <pc:sldMk cId="3911061869" sldId="268"/>
@@ -415,7 +415,7 @@
         </pc:picChg>
       </pc:sldChg>
       <pc:sldChg chg="addSp delSp modSp add mod setBg modNotesTx">
-        <pc:chgData name="Shao Yee Ng" userId="0aa19361c50ab943" providerId="LiveId" clId="{33B8D583-0499-42A2-82A3-3885EDF220E9}" dt="2020-09-01T02:16:37.709" v="2565" actId="20577"/>
+        <pc:chgData name="Shao Yee Ng" userId="0aa19361c50ab943" providerId="LiveId" clId="{33B8D583-0499-42A2-82A3-3885EDF220E9}" dt="2020-09-03T01:26:34.678" v="5516" actId="20577"/>
         <pc:sldMkLst>
           <pc:docMk/>
           <pc:sldMk cId="2086469871" sldId="270"/>
@@ -525,8 +525,8 @@
           </ac:picMkLst>
         </pc:picChg>
       </pc:sldChg>
-      <pc:sldChg chg="addSp delSp modSp add mod setBg setClrOvrMap modNotesTx">
-        <pc:chgData name="Shao Yee Ng" userId="0aa19361c50ab943" providerId="LiveId" clId="{33B8D583-0499-42A2-82A3-3885EDF220E9}" dt="2020-09-01T02:18:58.542" v="2830" actId="20577"/>
+      <pc:sldChg chg="addSp delSp modSp add del mod setBg setClrOvrMap modNotesTx">
+        <pc:chgData name="Shao Yee Ng" userId="0aa19361c50ab943" providerId="LiveId" clId="{33B8D583-0499-42A2-82A3-3885EDF220E9}" dt="2020-09-03T01:56:40.308" v="5531" actId="47"/>
         <pc:sldMkLst>
           <pc:docMk/>
           <pc:sldMk cId="373770894" sldId="271"/>
@@ -725,7 +725,7 @@
         </pc:picChg>
       </pc:sldChg>
       <pc:sldChg chg="addSp delSp modSp add mod setBg modNotesTx">
-        <pc:chgData name="Shao Yee Ng" userId="0aa19361c50ab943" providerId="LiveId" clId="{33B8D583-0499-42A2-82A3-3885EDF220E9}" dt="2020-09-01T02:20:04.157" v="3033" actId="20577"/>
+        <pc:chgData name="Shao Yee Ng" userId="0aa19361c50ab943" providerId="LiveId" clId="{33B8D583-0499-42A2-82A3-3885EDF220E9}" dt="2020-09-03T01:26:42.583" v="5520" actId="20577"/>
         <pc:sldMkLst>
           <pc:docMk/>
           <pc:sldMk cId="660572331" sldId="272"/>
@@ -836,7 +836,7 @@
         </pc:picChg>
       </pc:sldChg>
       <pc:sldChg chg="addSp delSp modSp add mod setBg modNotesTx">
-        <pc:chgData name="Shao Yee Ng" userId="0aa19361c50ab943" providerId="LiveId" clId="{33B8D583-0499-42A2-82A3-3885EDF220E9}" dt="2020-09-01T02:22:12.109" v="3323" actId="20577"/>
+        <pc:chgData name="Shao Yee Ng" userId="0aa19361c50ab943" providerId="LiveId" clId="{33B8D583-0499-42A2-82A3-3885EDF220E9}" dt="2020-09-03T01:26:40.820" v="5519" actId="20577"/>
         <pc:sldMkLst>
           <pc:docMk/>
           <pc:sldMk cId="1486536730" sldId="273"/>
@@ -954,7 +954,7 @@
         </pc:sldMkLst>
       </pc:sldChg>
       <pc:sldChg chg="addSp delSp modSp new mod setBg setClrOvrMap modNotesTx">
-        <pc:chgData name="Shao Yee Ng" userId="0aa19361c50ab943" providerId="LiveId" clId="{33B8D583-0499-42A2-82A3-3885EDF220E9}" dt="2020-09-01T02:26:38.685" v="4095" actId="20577"/>
+        <pc:chgData name="Shao Yee Ng" userId="0aa19361c50ab943" providerId="LiveId" clId="{33B8D583-0499-42A2-82A3-3885EDF220E9}" dt="2020-09-03T01:26:45.705" v="5521" actId="20577"/>
         <pc:sldMkLst>
           <pc:docMk/>
           <pc:sldMk cId="600629931" sldId="275"/>
@@ -1065,7 +1065,7 @@
         </pc:picChg>
       </pc:sldChg>
       <pc:sldChg chg="addSp delSp modSp new mod setBg setClrOvrMap modNotesTx">
-        <pc:chgData name="Shao Yee Ng" userId="0aa19361c50ab943" providerId="LiveId" clId="{33B8D583-0499-42A2-82A3-3885EDF220E9}" dt="2020-09-01T02:32:38.549" v="5223" actId="20577"/>
+        <pc:chgData name="Shao Yee Ng" userId="0aa19361c50ab943" providerId="LiveId" clId="{33B8D583-0499-42A2-82A3-3885EDF220E9}" dt="2020-09-03T01:26:47.910" v="5522" actId="20577"/>
         <pc:sldMkLst>
           <pc:docMk/>
           <pc:sldMk cId="4080437735" sldId="276"/>
@@ -1175,8 +1175,8 @@
           </ac:picMkLst>
         </pc:picChg>
       </pc:sldChg>
-      <pc:sldChg chg="addSp modSp new mod setBg">
-        <pc:chgData name="Shao Yee Ng" userId="0aa19361c50ab943" providerId="LiveId" clId="{33B8D583-0499-42A2-82A3-3885EDF220E9}" dt="2020-09-01T01:52:14.785" v="359" actId="26606"/>
+      <pc:sldChg chg="addSp modSp new mod setBg modNotesTx">
+        <pc:chgData name="Shao Yee Ng" userId="0aa19361c50ab943" providerId="LiveId" clId="{33B8D583-0499-42A2-82A3-3885EDF220E9}" dt="2020-09-03T01:26:50.387" v="5523" actId="20577"/>
         <pc:sldMkLst>
           <pc:docMk/>
           <pc:sldMk cId="1516643785" sldId="277"/>
@@ -1275,6 +1275,133 @@
             <pc:docMk/>
             <pc:sldMk cId="1516643785" sldId="277"/>
             <ac:picMk id="16" creationId="{6AC7D913-60B7-4603-881B-831DA5D3A940}"/>
+          </ac:picMkLst>
+        </pc:picChg>
+      </pc:sldChg>
+      <pc:sldChg chg="addSp delSp modSp new mod setBg">
+        <pc:chgData name="Shao Yee Ng" userId="0aa19361c50ab943" providerId="LiveId" clId="{33B8D583-0499-42A2-82A3-3885EDF220E9}" dt="2020-09-03T01:56:34.955" v="5530" actId="26606"/>
+        <pc:sldMkLst>
+          <pc:docMk/>
+          <pc:sldMk cId="3385100242" sldId="278"/>
+        </pc:sldMkLst>
+        <pc:spChg chg="mod">
+          <ac:chgData name="Shao Yee Ng" userId="0aa19361c50ab943" providerId="LiveId" clId="{33B8D583-0499-42A2-82A3-3885EDF220E9}" dt="2020-09-03T01:56:34.955" v="5530" actId="26606"/>
+          <ac:spMkLst>
+            <pc:docMk/>
+            <pc:sldMk cId="3385100242" sldId="278"/>
+            <ac:spMk id="2" creationId="{CCC9FFEB-E389-4C82-820C-AF3F8032168F}"/>
+          </ac:spMkLst>
+        </pc:spChg>
+        <pc:spChg chg="del">
+          <ac:chgData name="Shao Yee Ng" userId="0aa19361c50ab943" providerId="LiveId" clId="{33B8D583-0499-42A2-82A3-3885EDF220E9}" dt="2020-09-03T01:54:42.364" v="5526"/>
+          <ac:spMkLst>
+            <pc:docMk/>
+            <pc:sldMk cId="3385100242" sldId="278"/>
+            <ac:spMk id="3" creationId="{388E6C62-0A01-4EF7-B22B-5AE1E4AAEFAE}"/>
+          </ac:spMkLst>
+        </pc:spChg>
+        <pc:spChg chg="del">
+          <ac:chgData name="Shao Yee Ng" userId="0aa19361c50ab943" providerId="LiveId" clId="{33B8D583-0499-42A2-82A3-3885EDF220E9}" dt="2020-09-03T01:56:25.888" v="5529"/>
+          <ac:spMkLst>
+            <pc:docMk/>
+            <pc:sldMk cId="3385100242" sldId="278"/>
+            <ac:spMk id="4" creationId="{A22C67BE-1D60-4A82-836F-BF43524C520C}"/>
+          </ac:spMkLst>
+        </pc:spChg>
+        <pc:spChg chg="add">
+          <ac:chgData name="Shao Yee Ng" userId="0aa19361c50ab943" providerId="LiveId" clId="{33B8D583-0499-42A2-82A3-3885EDF220E9}" dt="2020-09-03T01:56:34.955" v="5530" actId="26606"/>
+          <ac:spMkLst>
+            <pc:docMk/>
+            <pc:sldMk cId="3385100242" sldId="278"/>
+            <ac:spMk id="16" creationId="{D42CF425-7213-4F89-B0FF-4C2BDDD9C680}"/>
+          </ac:spMkLst>
+        </pc:spChg>
+        <pc:spChg chg="add">
+          <ac:chgData name="Shao Yee Ng" userId="0aa19361c50ab943" providerId="LiveId" clId="{33B8D583-0499-42A2-82A3-3885EDF220E9}" dt="2020-09-03T01:56:34.955" v="5530" actId="26606"/>
+          <ac:spMkLst>
+            <pc:docMk/>
+            <pc:sldMk cId="3385100242" sldId="278"/>
+            <ac:spMk id="22" creationId="{202A25CB-1ED1-4C87-AB49-8D3BC684D1CE}"/>
+          </ac:spMkLst>
+        </pc:spChg>
+        <pc:spChg chg="add">
+          <ac:chgData name="Shao Yee Ng" userId="0aa19361c50ab943" providerId="LiveId" clId="{33B8D583-0499-42A2-82A3-3885EDF220E9}" dt="2020-09-03T01:56:34.955" v="5530" actId="26606"/>
+          <ac:spMkLst>
+            <pc:docMk/>
+            <pc:sldMk cId="3385100242" sldId="278"/>
+            <ac:spMk id="24" creationId="{505C8452-4C3F-46C5-AFD4-322854BC4176}"/>
+          </ac:spMkLst>
+        </pc:spChg>
+        <pc:spChg chg="add">
+          <ac:chgData name="Shao Yee Ng" userId="0aa19361c50ab943" providerId="LiveId" clId="{33B8D583-0499-42A2-82A3-3885EDF220E9}" dt="2020-09-03T01:56:34.955" v="5530" actId="26606"/>
+          <ac:spMkLst>
+            <pc:docMk/>
+            <pc:sldMk cId="3385100242" sldId="278"/>
+            <ac:spMk id="26" creationId="{9B06DBD9-DED6-40C2-A7AD-3662707C4145}"/>
+          </ac:spMkLst>
+        </pc:spChg>
+        <pc:spChg chg="add">
+          <ac:chgData name="Shao Yee Ng" userId="0aa19361c50ab943" providerId="LiveId" clId="{33B8D583-0499-42A2-82A3-3885EDF220E9}" dt="2020-09-03T01:56:34.955" v="5530" actId="26606"/>
+          <ac:spMkLst>
+            <pc:docMk/>
+            <pc:sldMk cId="3385100242" sldId="278"/>
+            <ac:spMk id="28" creationId="{B431FF8B-6FC2-47C1-B2C5-9B26E62436B0}"/>
+          </ac:spMkLst>
+        </pc:spChg>
+        <pc:spChg chg="add">
+          <ac:chgData name="Shao Yee Ng" userId="0aa19361c50ab943" providerId="LiveId" clId="{33B8D583-0499-42A2-82A3-3885EDF220E9}" dt="2020-09-03T01:56:34.955" v="5530" actId="26606"/>
+          <ac:spMkLst>
+            <pc:docMk/>
+            <pc:sldMk cId="3385100242" sldId="278"/>
+            <ac:spMk id="30" creationId="{4BA7EBCC-256E-4075-A58C-6ED2BFD5C99E}"/>
+          </ac:spMkLst>
+        </pc:spChg>
+        <pc:picChg chg="add mod">
+          <ac:chgData name="Shao Yee Ng" userId="0aa19361c50ab943" providerId="LiveId" clId="{33B8D583-0499-42A2-82A3-3885EDF220E9}" dt="2020-09-03T01:56:34.955" v="5530" actId="26606"/>
+          <ac:picMkLst>
+            <pc:docMk/>
+            <pc:sldMk cId="3385100242" sldId="278"/>
+            <ac:picMk id="6" creationId="{DC0AE682-83B1-40AA-80A5-B84FAAFBB710}"/>
+          </ac:picMkLst>
+        </pc:picChg>
+        <pc:picChg chg="add mod ord">
+          <ac:chgData name="Shao Yee Ng" userId="0aa19361c50ab943" providerId="LiveId" clId="{33B8D583-0499-42A2-82A3-3885EDF220E9}" dt="2020-09-03T01:56:34.955" v="5530" actId="26606"/>
+          <ac:picMkLst>
+            <pc:docMk/>
+            <pc:sldMk cId="3385100242" sldId="278"/>
+            <ac:picMk id="7" creationId="{3508A1EB-39ED-4697-8478-6BBA6BAFF4F0}"/>
+          </ac:picMkLst>
+        </pc:picChg>
+        <pc:picChg chg="add">
+          <ac:chgData name="Shao Yee Ng" userId="0aa19361c50ab943" providerId="LiveId" clId="{33B8D583-0499-42A2-82A3-3885EDF220E9}" dt="2020-09-03T01:56:34.955" v="5530" actId="26606"/>
+          <ac:picMkLst>
+            <pc:docMk/>
+            <pc:sldMk cId="3385100242" sldId="278"/>
+            <ac:picMk id="12" creationId="{412E3267-7ABE-412B-8580-47EC0D1F61FE}"/>
+          </ac:picMkLst>
+        </pc:picChg>
+        <pc:picChg chg="add">
+          <ac:chgData name="Shao Yee Ng" userId="0aa19361c50ab943" providerId="LiveId" clId="{33B8D583-0499-42A2-82A3-3885EDF220E9}" dt="2020-09-03T01:56:34.955" v="5530" actId="26606"/>
+          <ac:picMkLst>
+            <pc:docMk/>
+            <pc:sldMk cId="3385100242" sldId="278"/>
+            <ac:picMk id="14" creationId="{20B62C5A-2250-4380-AB23-DB87446CCED0}"/>
+          </ac:picMkLst>
+        </pc:picChg>
+        <pc:picChg chg="add">
+          <ac:chgData name="Shao Yee Ng" userId="0aa19361c50ab943" providerId="LiveId" clId="{33B8D583-0499-42A2-82A3-3885EDF220E9}" dt="2020-09-03T01:56:34.955" v="5530" actId="26606"/>
+          <ac:picMkLst>
+            <pc:docMk/>
+            <pc:sldMk cId="3385100242" sldId="278"/>
+            <ac:picMk id="18" creationId="{D35DA97D-88F8-4249-B650-4FC9FD50A382}"/>
+          </ac:picMkLst>
+        </pc:picChg>
+        <pc:picChg chg="add">
+          <ac:chgData name="Shao Yee Ng" userId="0aa19361c50ab943" providerId="LiveId" clId="{33B8D583-0499-42A2-82A3-3885EDF220E9}" dt="2020-09-03T01:56:34.955" v="5530" actId="26606"/>
+          <ac:picMkLst>
+            <pc:docMk/>
+            <pc:sldMk cId="3385100242" sldId="278"/>
+            <ac:picMk id="20" creationId="{43F38673-6E30-4BAE-AC67-0B283EBF4291}"/>
           </ac:picMkLst>
         </pc:picChg>
       </pc:sldChg>
@@ -5408,7 +5535,7 @@
           <a:p>
             <a:fld id="{AA61A8BD-CE27-4C5B-933E-C73FA749518E}" type="datetimeFigureOut">
               <a:rPr lang="en-AU" smtClean="0"/>
-              <a:t>1/09/2020</a:t>
+              <a:t>3/09/2020</a:t>
             </a:fld>
             <a:endParaRPr lang="en-AU"/>
           </a:p>
@@ -5720,18 +5847,7 @@
           <a:bodyPr/>
           <a:lstStyle/>
           <a:p>
-            <a:r>
-              <a:rPr lang="en-AU" dirty="0"/>
-              <a:t>Hi guys, I’m Yee. Welcome to my portfolio website presentation. In this presentation, I’m going to show you my </a:t>
-            </a:r>
-            <a:r>
-              <a:rPr lang="en-AU"/>
-              <a:t>progress on </a:t>
-            </a:r>
-            <a:r>
-              <a:rPr lang="en-AU" dirty="0"/>
-              <a:t>creating my portfolio website from scratch using HTML and CSS.</a:t>
-            </a:r>
+            <a:endParaRPr lang="en-AU" dirty="0"/>
           </a:p>
         </p:txBody>
       </p:sp>
@@ -5815,10 +5931,7 @@
           <a:bodyPr/>
           <a:lstStyle/>
           <a:p>
-            <a:r>
-              <a:rPr lang="en-AU" dirty="0"/>
-              <a:t>The first thing I did was design the structure and layout of the website using Balsamiq Wireframes.  In the next few slides, I’ll show you the different wireframes I created for the site. The wireframe you see on the left here is the homepage and it’s the parent of all the other pages on the site. It has a greeting, a photo and a short bio. I would like to take your attention to the navigation menu on top of the page. It’s a main component of the site as it helps users navigate to where they want to go on the site. This navigation menu or navigation bar is on all pages of the site. On the right hand side is the “About Me” page, originally, I planned to have another navigation bar for different HTML pages such as a separate page for education, a separate page for work experience and so on. But then when I was developing the website, I thought it would be a better idea to combine all these into one page so the page is cleaner with only one navigation bar. And that’s what I did with the actual website.</a:t>
-            </a:r>
+            <a:endParaRPr lang="en-AU" dirty="0"/>
           </a:p>
         </p:txBody>
       </p:sp>
@@ -5902,10 +6015,7 @@
           <a:bodyPr/>
           <a:lstStyle/>
           <a:p>
-            <a:r>
-              <a:rPr lang="en-AU" dirty="0"/>
-              <a:t>Here’s what the pages were going to look like if they were separate pages but I have combined them into one page.</a:t>
-            </a:r>
+            <a:endParaRPr lang="en-AU" dirty="0"/>
           </a:p>
         </p:txBody>
       </p:sp>
@@ -5989,10 +6099,7 @@
           <a:bodyPr/>
           <a:lstStyle/>
           <a:p>
-            <a:r>
-              <a:rPr lang="en-AU" dirty="0"/>
-              <a:t>This is the design for my “Skills” page. These blank boxes are icons for respective programming languages.</a:t>
-            </a:r>
+            <a:endParaRPr lang="en-AU" dirty="0"/>
           </a:p>
         </p:txBody>
       </p:sp>
@@ -6013,7 +6120,7 @@
           <a:p>
             <a:fld id="{1782B208-7C8C-4F60-AF6E-3A353C16FED7}" type="slidenum">
               <a:rPr lang="en-AU" smtClean="0"/>
-              <a:t>4</a:t>
+              <a:t>5</a:t>
             </a:fld>
             <a:endParaRPr lang="en-AU"/>
           </a:p>
@@ -6022,7 +6129,7 @@
     </p:spTree>
     <p:extLst>
       <p:ext uri="{BB962C8B-B14F-4D97-AF65-F5344CB8AC3E}">
-        <p14:creationId xmlns:p14="http://schemas.microsoft.com/office/powerpoint/2010/main" val="1878019791"/>
+        <p14:creationId xmlns:p14="http://schemas.microsoft.com/office/powerpoint/2010/main" val="62744605"/>
       </p:ext>
     </p:extLst>
   </p:cSld>
@@ -6076,10 +6183,7 @@
           <a:bodyPr/>
           <a:lstStyle/>
           <a:p>
-            <a:r>
-              <a:rPr lang="en-AU" dirty="0"/>
-              <a:t>These are the “Projects” and “Contact Me” HTML. With the social media icons, clicking or tapping the icon with bring the user to my social media account.</a:t>
-            </a:r>
+            <a:endParaRPr lang="en-AU" dirty="0"/>
           </a:p>
         </p:txBody>
       </p:sp>
@@ -6100,7 +6204,7 @@
           <a:p>
             <a:fld id="{1782B208-7C8C-4F60-AF6E-3A353C16FED7}" type="slidenum">
               <a:rPr lang="en-AU" smtClean="0"/>
-              <a:t>5</a:t>
+              <a:t>6</a:t>
             </a:fld>
             <a:endParaRPr lang="en-AU"/>
           </a:p>
@@ -6109,7 +6213,7 @@
     </p:spTree>
     <p:extLst>
       <p:ext uri="{BB962C8B-B14F-4D97-AF65-F5344CB8AC3E}">
-        <p14:creationId xmlns:p14="http://schemas.microsoft.com/office/powerpoint/2010/main" val="62744605"/>
+        <p14:creationId xmlns:p14="http://schemas.microsoft.com/office/powerpoint/2010/main" val="2806640146"/>
       </p:ext>
     </p:extLst>
   </p:cSld>
@@ -6163,10 +6267,7 @@
           <a:bodyPr/>
           <a:lstStyle/>
           <a:p>
-            <a:r>
-              <a:rPr lang="en-AU" dirty="0"/>
-              <a:t>And these are pages for my blog, the right wireframe has a list of links to my blog post with publish date. Clicking the link will bring the user to the blog post they want to read. And this is my blog post page.</a:t>
-            </a:r>
+            <a:endParaRPr lang="en-AU" dirty="0"/>
           </a:p>
         </p:txBody>
       </p:sp>
@@ -6187,7 +6288,7 @@
           <a:p>
             <a:fld id="{1782B208-7C8C-4F60-AF6E-3A353C16FED7}" type="slidenum">
               <a:rPr lang="en-AU" smtClean="0"/>
-              <a:t>6</a:t>
+              <a:t>7</a:t>
             </a:fld>
             <a:endParaRPr lang="en-AU"/>
           </a:p>
@@ -6196,7 +6297,7 @@
     </p:spTree>
     <p:extLst>
       <p:ext uri="{BB962C8B-B14F-4D97-AF65-F5344CB8AC3E}">
-        <p14:creationId xmlns:p14="http://schemas.microsoft.com/office/powerpoint/2010/main" val="2806640146"/>
+        <p14:creationId xmlns:p14="http://schemas.microsoft.com/office/powerpoint/2010/main" val="2628624113"/>
       </p:ext>
     </p:extLst>
   </p:cSld>
@@ -6250,10 +6351,7 @@
           <a:bodyPr/>
           <a:lstStyle/>
           <a:p>
-            <a:r>
-              <a:rPr lang="en-AU" dirty="0"/>
-              <a:t>This is the sitemap of the website showing the overall structure of the website. The home page is the parent page or grandparent page to all the other pages. A user can find information about me in the about me page and the blog link is the parent to all the blog posts. I forgot to mention that I have also decided to add another link to the navigation menu named “Technical Skills”. The reason I did this was because I think technical skills is very important consideration for prospective employers and having a separate page just for this would be quite handy.</a:t>
-            </a:r>
+            <a:endParaRPr lang="en-AU" dirty="0"/>
           </a:p>
         </p:txBody>
       </p:sp>
@@ -6274,7 +6372,7 @@
           <a:p>
             <a:fld id="{1782B208-7C8C-4F60-AF6E-3A353C16FED7}" type="slidenum">
               <a:rPr lang="en-AU" smtClean="0"/>
-              <a:t>7</a:t>
+              <a:t>8</a:t>
             </a:fld>
             <a:endParaRPr lang="en-AU"/>
           </a:p>
@@ -6283,7 +6381,7 @@
     </p:spTree>
     <p:extLst>
       <p:ext uri="{BB962C8B-B14F-4D97-AF65-F5344CB8AC3E}">
-        <p14:creationId xmlns:p14="http://schemas.microsoft.com/office/powerpoint/2010/main" val="2628624113"/>
+        <p14:creationId xmlns:p14="http://schemas.microsoft.com/office/powerpoint/2010/main" val="3395284032"/>
       </p:ext>
     </p:extLst>
   </p:cSld>
@@ -6337,18 +6435,7 @@
           <a:bodyPr/>
           <a:lstStyle/>
           <a:p>
-            <a:r>
-              <a:rPr lang="en-AU" dirty="0"/>
-              <a:t>When I was developing the website, these are the components I spent the most time on to make the website user friendly and easy to navigate. The main component being the navigation menu with all the links to their respective page. I have also use big headings throughout the pages to highlight what each page is about to capture the users’ attention. Instead of using the browser default font type and font size, I have chosen a font that I think is quite easy to read and make the fonts bigger. To make the website prettier, I used images instead of plain text to showcase my skills. To ensure that the website displayed properly on different screen sizes, I also applied the responsive design concepts I learned such as using percentages to size image and flexbox to display the images. Last but not least, I have used semantic HTML to give meaning to the content of an element such as header, section, article, figure, </a:t>
-            </a:r>
-            <a:r>
-              <a:rPr lang="en-AU" dirty="0" err="1"/>
-              <a:t>figcaption</a:t>
-            </a:r>
-            <a:r>
-              <a:rPr lang="en-AU" dirty="0"/>
-              <a:t> and so on. Now let me give you guys a live demo of the website that I deployed using Netlify.</a:t>
-            </a:r>
+            <a:endParaRPr lang="en-AU" dirty="0"/>
           </a:p>
         </p:txBody>
       </p:sp>
@@ -6369,7 +6456,7 @@
           <a:p>
             <a:fld id="{1782B208-7C8C-4F60-AF6E-3A353C16FED7}" type="slidenum">
               <a:rPr lang="en-AU" smtClean="0"/>
-              <a:t>8</a:t>
+              <a:t>9</a:t>
             </a:fld>
             <a:endParaRPr lang="en-AU"/>
           </a:p>
@@ -6378,7 +6465,7 @@
     </p:spTree>
     <p:extLst>
       <p:ext uri="{BB962C8B-B14F-4D97-AF65-F5344CB8AC3E}">
-        <p14:creationId xmlns:p14="http://schemas.microsoft.com/office/powerpoint/2010/main" val="3395284032"/>
+        <p14:creationId xmlns:p14="http://schemas.microsoft.com/office/powerpoint/2010/main" val="1659690160"/>
       </p:ext>
     </p:extLst>
   </p:cSld>
@@ -6574,7 +6661,7 @@
           <a:p>
             <a:fld id="{47D67F38-3C91-48CD-95ED-6940BCBBD6AD}" type="datetimeFigureOut">
               <a:rPr lang="en-AU" smtClean="0"/>
-              <a:t>1/09/2020</a:t>
+              <a:t>3/09/2020</a:t>
             </a:fld>
             <a:endParaRPr lang="en-AU"/>
           </a:p>
@@ -6849,7 +6936,7 @@
           <a:p>
             <a:fld id="{47D67F38-3C91-48CD-95ED-6940BCBBD6AD}" type="datetimeFigureOut">
               <a:rPr lang="en-AU" smtClean="0"/>
-              <a:t>1/09/2020</a:t>
+              <a:t>3/09/2020</a:t>
             </a:fld>
             <a:endParaRPr lang="en-AU"/>
           </a:p>
@@ -7043,7 +7130,7 @@
           <a:p>
             <a:fld id="{47D67F38-3C91-48CD-95ED-6940BCBBD6AD}" type="datetimeFigureOut">
               <a:rPr lang="en-AU" smtClean="0"/>
-              <a:t>1/09/2020</a:t>
+              <a:t>3/09/2020</a:t>
             </a:fld>
             <a:endParaRPr lang="en-AU"/>
           </a:p>
@@ -7316,7 +7403,7 @@
           <a:p>
             <a:fld id="{47D67F38-3C91-48CD-95ED-6940BCBBD6AD}" type="datetimeFigureOut">
               <a:rPr lang="en-AU" smtClean="0"/>
-              <a:t>1/09/2020</a:t>
+              <a:t>3/09/2020</a:t>
             </a:fld>
             <a:endParaRPr lang="en-AU"/>
           </a:p>
@@ -7657,7 +7744,7 @@
           <a:p>
             <a:fld id="{47D67F38-3C91-48CD-95ED-6940BCBBD6AD}" type="datetimeFigureOut">
               <a:rPr lang="en-AU" smtClean="0"/>
-              <a:t>1/09/2020</a:t>
+              <a:t>3/09/2020</a:t>
             </a:fld>
             <a:endParaRPr lang="en-AU"/>
           </a:p>
@@ -8280,7 +8367,7 @@
           <a:p>
             <a:fld id="{47D67F38-3C91-48CD-95ED-6940BCBBD6AD}" type="datetimeFigureOut">
               <a:rPr lang="en-AU" smtClean="0"/>
-              <a:t>1/09/2020</a:t>
+              <a:t>3/09/2020</a:t>
             </a:fld>
             <a:endParaRPr lang="en-AU"/>
           </a:p>
@@ -9140,7 +9227,7 @@
           <a:p>
             <a:fld id="{47D67F38-3C91-48CD-95ED-6940BCBBD6AD}" type="datetimeFigureOut">
               <a:rPr lang="en-AU" smtClean="0"/>
-              <a:t>1/09/2020</a:t>
+              <a:t>3/09/2020</a:t>
             </a:fld>
             <a:endParaRPr lang="en-AU"/>
           </a:p>
@@ -9310,7 +9397,7 @@
           <a:p>
             <a:fld id="{47D67F38-3C91-48CD-95ED-6940BCBBD6AD}" type="datetimeFigureOut">
               <a:rPr lang="en-AU" smtClean="0"/>
-              <a:t>1/09/2020</a:t>
+              <a:t>3/09/2020</a:t>
             </a:fld>
             <a:endParaRPr lang="en-AU"/>
           </a:p>
@@ -9490,7 +9577,7 @@
           <a:p>
             <a:fld id="{47D67F38-3C91-48CD-95ED-6940BCBBD6AD}" type="datetimeFigureOut">
               <a:rPr lang="en-AU" smtClean="0"/>
-              <a:t>1/09/2020</a:t>
+              <a:t>3/09/2020</a:t>
             </a:fld>
             <a:endParaRPr lang="en-AU"/>
           </a:p>
@@ -9660,7 +9747,7 @@
           <a:p>
             <a:fld id="{47D67F38-3C91-48CD-95ED-6940BCBBD6AD}" type="datetimeFigureOut">
               <a:rPr lang="en-AU" smtClean="0"/>
-              <a:t>1/09/2020</a:t>
+              <a:t>3/09/2020</a:t>
             </a:fld>
             <a:endParaRPr lang="en-AU"/>
           </a:p>
@@ -9907,7 +9994,7 @@
           <a:p>
             <a:fld id="{47D67F38-3C91-48CD-95ED-6940BCBBD6AD}" type="datetimeFigureOut">
               <a:rPr lang="en-AU" smtClean="0"/>
-              <a:t>1/09/2020</a:t>
+              <a:t>3/09/2020</a:t>
             </a:fld>
             <a:endParaRPr lang="en-AU"/>
           </a:p>
@@ -10199,7 +10286,7 @@
           <a:p>
             <a:fld id="{47D67F38-3C91-48CD-95ED-6940BCBBD6AD}" type="datetimeFigureOut">
               <a:rPr lang="en-AU" smtClean="0"/>
-              <a:t>1/09/2020</a:t>
+              <a:t>3/09/2020</a:t>
             </a:fld>
             <a:endParaRPr lang="en-AU"/>
           </a:p>
@@ -10643,7 +10730,7 @@
           <a:p>
             <a:fld id="{47D67F38-3C91-48CD-95ED-6940BCBBD6AD}" type="datetimeFigureOut">
               <a:rPr lang="en-AU" smtClean="0"/>
-              <a:t>1/09/2020</a:t>
+              <a:t>3/09/2020</a:t>
             </a:fld>
             <a:endParaRPr lang="en-AU"/>
           </a:p>
@@ -10761,7 +10848,7 @@
           <a:p>
             <a:fld id="{47D67F38-3C91-48CD-95ED-6940BCBBD6AD}" type="datetimeFigureOut">
               <a:rPr lang="en-AU" smtClean="0"/>
-              <a:t>1/09/2020</a:t>
+              <a:t>3/09/2020</a:t>
             </a:fld>
             <a:endParaRPr lang="en-AU"/>
           </a:p>
@@ -10856,7 +10943,7 @@
           <a:p>
             <a:fld id="{47D67F38-3C91-48CD-95ED-6940BCBBD6AD}" type="datetimeFigureOut">
               <a:rPr lang="en-AU" smtClean="0"/>
-              <a:t>1/09/2020</a:t>
+              <a:t>3/09/2020</a:t>
             </a:fld>
             <a:endParaRPr lang="en-AU"/>
           </a:p>
@@ -11135,7 +11222,7 @@
           <a:p>
             <a:fld id="{47D67F38-3C91-48CD-95ED-6940BCBBD6AD}" type="datetimeFigureOut">
               <a:rPr lang="en-AU" smtClean="0"/>
-              <a:t>1/09/2020</a:t>
+              <a:t>3/09/2020</a:t>
             </a:fld>
             <a:endParaRPr lang="en-AU"/>
           </a:p>
@@ -11410,7 +11497,7 @@
           <a:p>
             <a:fld id="{47D67F38-3C91-48CD-95ED-6940BCBBD6AD}" type="datetimeFigureOut">
               <a:rPr lang="en-AU" smtClean="0"/>
-              <a:t>1/09/2020</a:t>
+              <a:t>3/09/2020</a:t>
             </a:fld>
             <a:endParaRPr lang="en-AU"/>
           </a:p>
@@ -11839,7 +11926,7 @@
           <a:p>
             <a:fld id="{47D67F38-3C91-48CD-95ED-6940BCBBD6AD}" type="datetimeFigureOut">
               <a:rPr lang="en-AU" smtClean="0"/>
-              <a:t>1/09/2020</a:t>
+              <a:t>3/09/2020</a:t>
             </a:fld>
             <a:endParaRPr lang="en-AU"/>
           </a:p>
@@ -15457,7 +15544,7 @@
           <a:lstStyle/>
           <a:p>
             <a:r>
-              <a:rPr lang="en-US" sz="4800">
+              <a:rPr lang="en-US" sz="4800" dirty="0">
                 <a:solidFill>
                   <a:srgbClr val="EBEBEB"/>
                 </a:solidFill>
@@ -15485,9 +15572,25 @@
   <p:cSld>
     <p:bg>
       <p:bgPr>
-        <a:solidFill>
-          <a:schemeClr val="bg1"/>
-        </a:solidFill>
+        <a:blipFill rotWithShape="1">
+          <a:blip r:embed="rId2">
+            <a:duotone>
+              <a:schemeClr val="bg2">
+                <a:shade val="69000"/>
+                <a:hueMod val="108000"/>
+                <a:satMod val="164000"/>
+                <a:lumMod val="74000"/>
+              </a:schemeClr>
+              <a:schemeClr val="bg2">
+                <a:tint val="96000"/>
+                <a:hueMod val="88000"/>
+                <a:satMod val="140000"/>
+                <a:lumMod val="132000"/>
+              </a:schemeClr>
+            </a:duotone>
+          </a:blip>
+          <a:stretch/>
+        </a:blipFill>
         <a:effectLst/>
       </p:bgPr>
     </p:bg>
@@ -15507,10 +15610,10 @@
       </p:grpSpPr>
       <p:pic>
         <p:nvPicPr>
-          <p:cNvPr id="32" name="Picture 31">
+          <p:cNvPr id="12" name="Picture 11">
             <a:extLst>
               <a:ext uri="{FF2B5EF4-FFF2-40B4-BE49-F238E27FC236}">
-                <a16:creationId xmlns:a16="http://schemas.microsoft.com/office/drawing/2014/main" id="{41B68C77-138E-4BF7-A276-BD0C78A4219F}"/>
+                <a16:creationId xmlns:a16="http://schemas.microsoft.com/office/drawing/2014/main" id="{412E3267-7ABE-412B-8580-47EC0D1F61FE}"/>
               </a:ext>
               <a:ext uri="{C183D7F6-B498-43B3-948B-1728B52AA6E4}">
                 <adec:decorative xmlns:adec="http://schemas.microsoft.com/office/drawing/2017/decorative" val="1"/>
@@ -15551,10 +15654,10 @@
       </p:pic>
       <p:pic>
         <p:nvPicPr>
-          <p:cNvPr id="34" name="Picture 33">
+          <p:cNvPr id="14" name="Picture 13">
             <a:extLst>
               <a:ext uri="{FF2B5EF4-FFF2-40B4-BE49-F238E27FC236}">
-                <a16:creationId xmlns:a16="http://schemas.microsoft.com/office/drawing/2014/main" id="{7C268552-D473-46ED-B1B8-422042C4DEF1}"/>
+                <a16:creationId xmlns:a16="http://schemas.microsoft.com/office/drawing/2014/main" id="{20B62C5A-2250-4380-AB23-DB87446CCED0}"/>
               </a:ext>
               <a:ext uri="{C183D7F6-B498-43B3-948B-1728B52AA6E4}">
                 <adec:decorative xmlns:adec="http://schemas.microsoft.com/office/drawing/2017/decorative" val="1"/>
@@ -15595,10 +15698,10 @@
       </p:pic>
       <p:sp>
         <p:nvSpPr>
-          <p:cNvPr id="36" name="Oval 35">
+          <p:cNvPr id="16" name="Oval 15">
             <a:extLst>
               <a:ext uri="{FF2B5EF4-FFF2-40B4-BE49-F238E27FC236}">
-                <a16:creationId xmlns:a16="http://schemas.microsoft.com/office/drawing/2014/main" id="{4AC0CD9D-7610-4620-93B4-798CCD9AB581}"/>
+                <a16:creationId xmlns:a16="http://schemas.microsoft.com/office/drawing/2014/main" id="{D42CF425-7213-4F89-B0FF-4C2BDDD9C680}"/>
               </a:ext>
               <a:ext uri="{C183D7F6-B498-43B3-948B-1728B52AA6E4}">
                 <adec:decorative xmlns:adec="http://schemas.microsoft.com/office/drawing/2017/decorative" val="1"/>
@@ -15675,10 +15778,10 @@
       </p:sp>
       <p:pic>
         <p:nvPicPr>
-          <p:cNvPr id="38" name="Picture 37">
+          <p:cNvPr id="18" name="Picture 17">
             <a:extLst>
               <a:ext uri="{FF2B5EF4-FFF2-40B4-BE49-F238E27FC236}">
-                <a16:creationId xmlns:a16="http://schemas.microsoft.com/office/drawing/2014/main" id="{B9238B3E-24AA-439A-B527-6C5DF6D72145}"/>
+                <a16:creationId xmlns:a16="http://schemas.microsoft.com/office/drawing/2014/main" id="{D35DA97D-88F8-4249-B650-4FC9FD50A382}"/>
               </a:ext>
               <a:ext uri="{C183D7F6-B498-43B3-948B-1728B52AA6E4}">
                 <adec:decorative xmlns:adec="http://schemas.microsoft.com/office/drawing/2017/decorative" val="1"/>
@@ -15719,10 +15822,10 @@
       </p:pic>
       <p:pic>
         <p:nvPicPr>
-          <p:cNvPr id="40" name="Picture 39">
+          <p:cNvPr id="20" name="Picture 19">
             <a:extLst>
               <a:ext uri="{FF2B5EF4-FFF2-40B4-BE49-F238E27FC236}">
-                <a16:creationId xmlns:a16="http://schemas.microsoft.com/office/drawing/2014/main" id="{69F01145-BEA3-4CBF-AA21-10077B948CA8}"/>
+                <a16:creationId xmlns:a16="http://schemas.microsoft.com/office/drawing/2014/main" id="{43F38673-6E30-4BAE-AC67-0B283EBF4291}"/>
               </a:ext>
               <a:ext uri="{C183D7F6-B498-43B3-948B-1728B52AA6E4}">
                 <adec:decorative xmlns:adec="http://schemas.microsoft.com/office/drawing/2017/decorative" val="1"/>
@@ -15763,10 +15866,10 @@
       </p:pic>
       <p:sp>
         <p:nvSpPr>
-          <p:cNvPr id="42" name="Rectangle 41">
+          <p:cNvPr id="22" name="Rectangle 21">
             <a:extLst>
               <a:ext uri="{FF2B5EF4-FFF2-40B4-BE49-F238E27FC236}">
-                <a16:creationId xmlns:a16="http://schemas.microsoft.com/office/drawing/2014/main" id="{DE4D62F9-188E-4530-84C2-24BDEE4BEB82}"/>
+                <a16:creationId xmlns:a16="http://schemas.microsoft.com/office/drawing/2014/main" id="{202A25CB-1ED1-4C87-AB49-8D3BC684D1CE}"/>
               </a:ext>
               <a:ext uri="{C183D7F6-B498-43B3-948B-1728B52AA6E4}">
                 <adec:decorative xmlns:adec="http://schemas.microsoft.com/office/drawing/2017/decorative" val="1"/>
@@ -15816,10 +15919,10 @@
       </p:sp>
       <p:sp>
         <p:nvSpPr>
-          <p:cNvPr id="44" name="Rectangle 43">
+          <p:cNvPr id="24" name="Rectangle 23">
             <a:extLst>
               <a:ext uri="{FF2B5EF4-FFF2-40B4-BE49-F238E27FC236}">
-                <a16:creationId xmlns:a16="http://schemas.microsoft.com/office/drawing/2014/main" id="{757B325C-3E35-45CF-9D07-3BCB281F3B9C}"/>
+                <a16:creationId xmlns:a16="http://schemas.microsoft.com/office/drawing/2014/main" id="{505C8452-4C3F-46C5-AFD4-322854BC4176}"/>
               </a:ext>
               <a:ext uri="{C183D7F6-B498-43B3-948B-1728B52AA6E4}">
                 <adec:decorative xmlns:adec="http://schemas.microsoft.com/office/drawing/2017/decorative" val="1"/>
@@ -15839,893 +15942,15 @@
         </p:nvSpPr>
         <p:spPr>
           <a:xfrm>
-            <a:off x="0" y="0"/>
-            <a:ext cx="12192000" cy="6858000"/>
+            <a:off x="0" y="-5"/>
+            <a:ext cx="12191695" cy="4730744"/>
           </a:xfrm>
           <a:prstGeom prst="rect">
             <a:avLst/>
           </a:prstGeom>
-          <a:ln>
-            <a:noFill/>
-          </a:ln>
-        </p:spPr>
-        <p:style>
-          <a:lnRef idx="2">
-            <a:schemeClr val="accent1">
-              <a:shade val="50000"/>
-            </a:schemeClr>
-          </a:lnRef>
-          <a:fillRef idx="1003">
-            <a:schemeClr val="dk2"/>
-          </a:fillRef>
-          <a:effectRef idx="0">
-            <a:schemeClr val="accent1"/>
-          </a:effectRef>
-          <a:fontRef idx="minor">
-            <a:schemeClr val="lt1"/>
-          </a:fontRef>
-        </p:style>
-        <p:txBody>
-          <a:bodyPr rtlCol="0" anchor="ctr"/>
-          <a:lstStyle/>
-          <a:p>
-            <a:pPr algn="ctr"/>
-            <a:endParaRPr lang="en-US"/>
-          </a:p>
-        </p:txBody>
-      </p:sp>
-      <p:sp>
-        <p:nvSpPr>
-          <p:cNvPr id="2" name="Title 1">
-            <a:extLst>
-              <a:ext uri="{FF2B5EF4-FFF2-40B4-BE49-F238E27FC236}">
-                <a16:creationId xmlns:a16="http://schemas.microsoft.com/office/drawing/2014/main" id="{4BC16802-A1E8-4CCD-855D-7687006D076B}"/>
-              </a:ext>
-            </a:extLst>
-          </p:cNvPr>
-          <p:cNvSpPr>
-            <a:spLocks noGrp="1"/>
-          </p:cNvSpPr>
-          <p:nvPr>
-            <p:ph type="title"/>
-          </p:nvPr>
-        </p:nvSpPr>
-        <p:spPr>
-          <a:xfrm>
-            <a:off x="8191925" y="1325880"/>
-            <a:ext cx="3352375" cy="3066507"/>
-          </a:xfrm>
-        </p:spPr>
-        <p:txBody>
-          <a:bodyPr vert="horz" lIns="91440" tIns="45720" rIns="91440" bIns="45720" rtlCol="0" anchor="b">
-            <a:normAutofit/>
-          </a:bodyPr>
-          <a:lstStyle/>
-          <a:p>
-            <a:r>
-              <a:rPr lang="en-US" sz="4600" b="0" i="0" kern="1200">
-                <a:solidFill>
-                  <a:srgbClr val="EBEBEB"/>
-                </a:solidFill>
-                <a:latin typeface="+mj-lt"/>
-                <a:ea typeface="+mj-ea"/>
-                <a:cs typeface="+mj-cs"/>
-              </a:rPr>
-              <a:t>Balsamiq Wireframes</a:t>
-            </a:r>
-          </a:p>
-        </p:txBody>
-      </p:sp>
-      <p:sp>
-        <p:nvSpPr>
-          <p:cNvPr id="46" name="Freeform 36">
-            <a:extLst>
-              <a:ext uri="{FF2B5EF4-FFF2-40B4-BE49-F238E27FC236}">
-                <a16:creationId xmlns:a16="http://schemas.microsoft.com/office/drawing/2014/main" id="{C24BEC42-AFF3-40D1-93A2-A27A42E1E23C}"/>
-              </a:ext>
-              <a:ext uri="{C183D7F6-B498-43B3-948B-1728B52AA6E4}">
-                <adec:decorative xmlns:adec="http://schemas.microsoft.com/office/drawing/2017/decorative" val="1"/>
-              </a:ext>
-            </a:extLst>
-          </p:cNvPr>
-          <p:cNvSpPr>
-            <a:spLocks noGrp="1" noRot="1" noChangeAspect="1" noMove="1" noResize="1" noEditPoints="1" noAdjustHandles="1" noChangeArrowheads="1" noChangeShapeType="1" noTextEdit="1"/>
-          </p:cNvSpPr>
-          <p:nvPr>
-            <p:extLst>
-              <p:ext uri="{386F3935-93C4-4BCD-93E2-E3B085C9AB24}">
-                <p16:designElem xmlns:p16="http://schemas.microsoft.com/office/powerpoint/2015/main" val="1"/>
-              </p:ext>
-            </p:extLst>
-          </p:nvPr>
-        </p:nvSpPr>
-        <p:spPr>
-          <a:xfrm flipH="1">
-            <a:off x="7463681" y="-1"/>
-            <a:ext cx="559472" cy="3709642"/>
-          </a:xfrm>
-          <a:custGeom>
-            <a:avLst/>
-            <a:gdLst>
-              <a:gd name="connsiteX0" fmla="*/ 0 w 559472"/>
-              <a:gd name="connsiteY0" fmla="*/ 0 h 3709642"/>
-              <a:gd name="connsiteX1" fmla="*/ 473952 w 559472"/>
-              <a:gd name="connsiteY1" fmla="*/ 0 h 3709642"/>
-              <a:gd name="connsiteX2" fmla="*/ 485840 w 559472"/>
-              <a:gd name="connsiteY2" fmla="*/ 161194 h 3709642"/>
-              <a:gd name="connsiteX3" fmla="*/ 523949 w 559472"/>
-              <a:gd name="connsiteY3" fmla="*/ 3672197 h 3709642"/>
-              <a:gd name="connsiteX4" fmla="*/ 454748 w 559472"/>
-              <a:gd name="connsiteY4" fmla="*/ 3709642 h 3709642"/>
-              <a:gd name="connsiteX5" fmla="*/ 448224 w 559472"/>
-              <a:gd name="connsiteY5" fmla="*/ 3510471 h 3709642"/>
-              <a:gd name="connsiteX6" fmla="*/ 443564 w 559472"/>
-              <a:gd name="connsiteY6" fmla="*/ 3408563 h 3709642"/>
-              <a:gd name="connsiteX7" fmla="*/ 438902 w 559472"/>
-              <a:gd name="connsiteY7" fmla="*/ 3304407 h 3709642"/>
-              <a:gd name="connsiteX8" fmla="*/ 433941 w 559472"/>
-              <a:gd name="connsiteY8" fmla="*/ 3198777 h 3709642"/>
-              <a:gd name="connsiteX9" fmla="*/ 427584 w 559472"/>
-              <a:gd name="connsiteY9" fmla="*/ 3092510 h 3709642"/>
-              <a:gd name="connsiteX10" fmla="*/ 420988 w 559472"/>
-              <a:gd name="connsiteY10" fmla="*/ 2984390 h 3709642"/>
-              <a:gd name="connsiteX11" fmla="*/ 414330 w 559472"/>
-              <a:gd name="connsiteY11" fmla="*/ 2874401 h 3709642"/>
-              <a:gd name="connsiteX12" fmla="*/ 406840 w 559472"/>
-              <a:gd name="connsiteY12" fmla="*/ 2762980 h 3709642"/>
-              <a:gd name="connsiteX13" fmla="*/ 397745 w 559472"/>
-              <a:gd name="connsiteY13" fmla="*/ 2650566 h 3709642"/>
-              <a:gd name="connsiteX14" fmla="*/ 389154 w 559472"/>
-              <a:gd name="connsiteY14" fmla="*/ 2536612 h 3709642"/>
-              <a:gd name="connsiteX15" fmla="*/ 379225 w 559472"/>
-              <a:gd name="connsiteY15" fmla="*/ 2421642 h 3709642"/>
-              <a:gd name="connsiteX16" fmla="*/ 368316 w 559472"/>
-              <a:gd name="connsiteY16" fmla="*/ 2305627 h 3709642"/>
-              <a:gd name="connsiteX17" fmla="*/ 357466 w 559472"/>
-              <a:gd name="connsiteY17" fmla="*/ 2189233 h 3709642"/>
-              <a:gd name="connsiteX18" fmla="*/ 344982 w 559472"/>
-              <a:gd name="connsiteY18" fmla="*/ 2071473 h 3709642"/>
-              <a:gd name="connsiteX19" fmla="*/ 332466 w 559472"/>
-              <a:gd name="connsiteY19" fmla="*/ 1952216 h 3709642"/>
-              <a:gd name="connsiteX20" fmla="*/ 319121 w 559472"/>
-              <a:gd name="connsiteY20" fmla="*/ 1833776 h 3709642"/>
-              <a:gd name="connsiteX21" fmla="*/ 304408 w 559472"/>
-              <a:gd name="connsiteY21" fmla="*/ 1713948 h 3709642"/>
-              <a:gd name="connsiteX22" fmla="*/ 288685 w 559472"/>
-              <a:gd name="connsiteY22" fmla="*/ 1592703 h 3709642"/>
-              <a:gd name="connsiteX23" fmla="*/ 273050 w 559472"/>
-              <a:gd name="connsiteY23" fmla="*/ 1471451 h 3709642"/>
-              <a:gd name="connsiteX24" fmla="*/ 255813 w 559472"/>
-              <a:gd name="connsiteY24" fmla="*/ 1350328 h 3709642"/>
-              <a:gd name="connsiteX25" fmla="*/ 237060 w 559472"/>
-              <a:gd name="connsiteY25" fmla="*/ 1227080 h 3709642"/>
-              <a:gd name="connsiteX26" fmla="*/ 218488 w 559472"/>
-              <a:gd name="connsiteY26" fmla="*/ 1106065 h 3709642"/>
-              <a:gd name="connsiteX27" fmla="*/ 198221 w 559472"/>
-              <a:gd name="connsiteY27" fmla="*/ 982940 h 3709642"/>
-              <a:gd name="connsiteX28" fmla="*/ 177152 w 559472"/>
-              <a:gd name="connsiteY28" fmla="*/ 858755 h 3709642"/>
-              <a:gd name="connsiteX29" fmla="*/ 155551 w 559472"/>
-              <a:gd name="connsiteY29" fmla="*/ 736861 h 3709642"/>
-              <a:gd name="connsiteX30" fmla="*/ 131782 w 559472"/>
-              <a:gd name="connsiteY30" fmla="*/ 613645 h 3709642"/>
-              <a:gd name="connsiteX31" fmla="*/ 107123 w 559472"/>
-              <a:gd name="connsiteY31" fmla="*/ 490500 h 3709642"/>
-              <a:gd name="connsiteX32" fmla="*/ 82552 w 559472"/>
-              <a:gd name="connsiteY32" fmla="*/ 367348 h 3709642"/>
-              <a:gd name="connsiteX33" fmla="*/ 55608 w 559472"/>
-              <a:gd name="connsiteY33" fmla="*/ 244762 h 3709642"/>
-              <a:gd name="connsiteX34" fmla="*/ 28130 w 559472"/>
-              <a:gd name="connsiteY34" fmla="*/ 122220 h 3709642"/>
-              <a:gd name="connsiteX35" fmla="*/ 0 w 559472"/>
-              <a:gd name="connsiteY35" fmla="*/ 0 h 3709642"/>
-            </a:gdLst>
-            <a:ahLst/>
-            <a:cxnLst>
-              <a:cxn ang="0">
-                <a:pos x="connsiteX0" y="connsiteY0"/>
-              </a:cxn>
-              <a:cxn ang="0">
-                <a:pos x="connsiteX1" y="connsiteY1"/>
-              </a:cxn>
-              <a:cxn ang="0">
-                <a:pos x="connsiteX2" y="connsiteY2"/>
-              </a:cxn>
-              <a:cxn ang="0">
-                <a:pos x="connsiteX3" y="connsiteY3"/>
-              </a:cxn>
-              <a:cxn ang="0">
-                <a:pos x="connsiteX4" y="connsiteY4"/>
-              </a:cxn>
-              <a:cxn ang="0">
-                <a:pos x="connsiteX5" y="connsiteY5"/>
-              </a:cxn>
-              <a:cxn ang="0">
-                <a:pos x="connsiteX6" y="connsiteY6"/>
-              </a:cxn>
-              <a:cxn ang="0">
-                <a:pos x="connsiteX7" y="connsiteY7"/>
-              </a:cxn>
-              <a:cxn ang="0">
-                <a:pos x="connsiteX8" y="connsiteY8"/>
-              </a:cxn>
-              <a:cxn ang="0">
-                <a:pos x="connsiteX9" y="connsiteY9"/>
-              </a:cxn>
-              <a:cxn ang="0">
-                <a:pos x="connsiteX10" y="connsiteY10"/>
-              </a:cxn>
-              <a:cxn ang="0">
-                <a:pos x="connsiteX11" y="connsiteY11"/>
-              </a:cxn>
-              <a:cxn ang="0">
-                <a:pos x="connsiteX12" y="connsiteY12"/>
-              </a:cxn>
-              <a:cxn ang="0">
-                <a:pos x="connsiteX13" y="connsiteY13"/>
-              </a:cxn>
-              <a:cxn ang="0">
-                <a:pos x="connsiteX14" y="connsiteY14"/>
-              </a:cxn>
-              <a:cxn ang="0">
-                <a:pos x="connsiteX15" y="connsiteY15"/>
-              </a:cxn>
-              <a:cxn ang="0">
-                <a:pos x="connsiteX16" y="connsiteY16"/>
-              </a:cxn>
-              <a:cxn ang="0">
-                <a:pos x="connsiteX17" y="connsiteY17"/>
-              </a:cxn>
-              <a:cxn ang="0">
-                <a:pos x="connsiteX18" y="connsiteY18"/>
-              </a:cxn>
-              <a:cxn ang="0">
-                <a:pos x="connsiteX19" y="connsiteY19"/>
-              </a:cxn>
-              <a:cxn ang="0">
-                <a:pos x="connsiteX20" y="connsiteY20"/>
-              </a:cxn>
-              <a:cxn ang="0">
-                <a:pos x="connsiteX21" y="connsiteY21"/>
-              </a:cxn>
-              <a:cxn ang="0">
-                <a:pos x="connsiteX22" y="connsiteY22"/>
-              </a:cxn>
-              <a:cxn ang="0">
-                <a:pos x="connsiteX23" y="connsiteY23"/>
-              </a:cxn>
-              <a:cxn ang="0">
-                <a:pos x="connsiteX24" y="connsiteY24"/>
-              </a:cxn>
-              <a:cxn ang="0">
-                <a:pos x="connsiteX25" y="connsiteY25"/>
-              </a:cxn>
-              <a:cxn ang="0">
-                <a:pos x="connsiteX26" y="connsiteY26"/>
-              </a:cxn>
-              <a:cxn ang="0">
-                <a:pos x="connsiteX27" y="connsiteY27"/>
-              </a:cxn>
-              <a:cxn ang="0">
-                <a:pos x="connsiteX28" y="connsiteY28"/>
-              </a:cxn>
-              <a:cxn ang="0">
-                <a:pos x="connsiteX29" y="connsiteY29"/>
-              </a:cxn>
-              <a:cxn ang="0">
-                <a:pos x="connsiteX30" y="connsiteY30"/>
-              </a:cxn>
-              <a:cxn ang="0">
-                <a:pos x="connsiteX31" y="connsiteY31"/>
-              </a:cxn>
-              <a:cxn ang="0">
-                <a:pos x="connsiteX32" y="connsiteY32"/>
-              </a:cxn>
-              <a:cxn ang="0">
-                <a:pos x="connsiteX33" y="connsiteY33"/>
-              </a:cxn>
-              <a:cxn ang="0">
-                <a:pos x="connsiteX34" y="connsiteY34"/>
-              </a:cxn>
-              <a:cxn ang="0">
-                <a:pos x="connsiteX35" y="connsiteY35"/>
-              </a:cxn>
-            </a:cxnLst>
-            <a:rect l="l" t="t" r="r" b="b"/>
-            <a:pathLst>
-              <a:path w="559472" h="3709642">
-                <a:moveTo>
-                  <a:pt x="0" y="0"/>
-                </a:moveTo>
-                <a:lnTo>
-                  <a:pt x="473952" y="0"/>
-                </a:lnTo>
-                <a:lnTo>
-                  <a:pt x="485840" y="161194"/>
-                </a:lnTo>
-                <a:cubicBezTo>
-                  <a:pt x="552063" y="1147770"/>
-                  <a:pt x="592441" y="3086737"/>
-                  <a:pt x="523949" y="3672197"/>
-                </a:cubicBezTo>
-                <a:cubicBezTo>
-                  <a:pt x="500842" y="3684557"/>
-                  <a:pt x="477855" y="3697282"/>
-                  <a:pt x="454748" y="3709642"/>
-                </a:cubicBezTo>
-                <a:lnTo>
-                  <a:pt x="448224" y="3510471"/>
-                </a:lnTo>
-                <a:lnTo>
-                  <a:pt x="443564" y="3408563"/>
-                </a:lnTo>
-                <a:lnTo>
-                  <a:pt x="438902" y="3304407"/>
-                </a:lnTo>
-                <a:lnTo>
-                  <a:pt x="433941" y="3198777"/>
-                </a:lnTo>
-                <a:lnTo>
-                  <a:pt x="427584" y="3092510"/>
-                </a:lnTo>
-                <a:lnTo>
-                  <a:pt x="420988" y="2984390"/>
-                </a:lnTo>
-                <a:lnTo>
-                  <a:pt x="414330" y="2874401"/>
-                </a:lnTo>
-                <a:lnTo>
-                  <a:pt x="406840" y="2762980"/>
-                </a:lnTo>
-                <a:lnTo>
-                  <a:pt x="397745" y="2650566"/>
-                </a:lnTo>
-                <a:lnTo>
-                  <a:pt x="389154" y="2536612"/>
-                </a:lnTo>
-                <a:lnTo>
-                  <a:pt x="379225" y="2421642"/>
-                </a:lnTo>
-                <a:lnTo>
-                  <a:pt x="368316" y="2305627"/>
-                </a:lnTo>
-                <a:lnTo>
-                  <a:pt x="357466" y="2189233"/>
-                </a:lnTo>
-                <a:lnTo>
-                  <a:pt x="344982" y="2071473"/>
-                </a:lnTo>
-                <a:lnTo>
-                  <a:pt x="332466" y="1952216"/>
-                </a:lnTo>
-                <a:lnTo>
-                  <a:pt x="319121" y="1833776"/>
-                </a:lnTo>
-                <a:lnTo>
-                  <a:pt x="304408" y="1713948"/>
-                </a:lnTo>
-                <a:lnTo>
-                  <a:pt x="288685" y="1592703"/>
-                </a:lnTo>
-                <a:lnTo>
-                  <a:pt x="273050" y="1471451"/>
-                </a:lnTo>
-                <a:lnTo>
-                  <a:pt x="255813" y="1350328"/>
-                </a:lnTo>
-                <a:lnTo>
-                  <a:pt x="237060" y="1227080"/>
-                </a:lnTo>
-                <a:lnTo>
-                  <a:pt x="218488" y="1106065"/>
-                </a:lnTo>
-                <a:lnTo>
-                  <a:pt x="198221" y="982940"/>
-                </a:lnTo>
-                <a:lnTo>
-                  <a:pt x="177152" y="858755"/>
-                </a:lnTo>
-                <a:lnTo>
-                  <a:pt x="155551" y="736861"/>
-                </a:lnTo>
-                <a:lnTo>
-                  <a:pt x="131782" y="613645"/>
-                </a:lnTo>
-                <a:lnTo>
-                  <a:pt x="107123" y="490500"/>
-                </a:lnTo>
-                <a:lnTo>
-                  <a:pt x="82552" y="367348"/>
-                </a:lnTo>
-                <a:lnTo>
-                  <a:pt x="55608" y="244762"/>
-                </a:lnTo>
-                <a:lnTo>
-                  <a:pt x="28130" y="122220"/>
-                </a:lnTo>
-                <a:lnTo>
-                  <a:pt x="0" y="0"/>
-                </a:lnTo>
-                <a:close/>
-              </a:path>
-            </a:pathLst>
-          </a:custGeom>
           <a:solidFill>
-            <a:schemeClr val="bg1">
-              <a:alpha val="20000"/>
-            </a:schemeClr>
+            <a:srgbClr val="FFFFFF"/>
           </a:solidFill>
-          <a:ln>
-            <a:noFill/>
-          </a:ln>
-        </p:spPr>
-        <p:txBody>
-          <a:bodyPr rtlCol="0" anchor="ctr"/>
-          <a:lstStyle/>
-          <a:p>
-            <a:pPr algn="ctr"/>
-            <a:endParaRPr lang="en-US"/>
-          </a:p>
-        </p:txBody>
-      </p:sp>
-      <p:sp useBgFill="1">
-        <p:nvSpPr>
-          <p:cNvPr id="48" name="Freeform: Shape 47">
-            <a:extLst>
-              <a:ext uri="{FF2B5EF4-FFF2-40B4-BE49-F238E27FC236}">
-                <a16:creationId xmlns:a16="http://schemas.microsoft.com/office/drawing/2014/main" id="{608F427C-1EC9-4280-9367-F2B3AA063E82}"/>
-              </a:ext>
-              <a:ext uri="{C183D7F6-B498-43B3-948B-1728B52AA6E4}">
-                <adec:decorative xmlns:adec="http://schemas.microsoft.com/office/drawing/2017/decorative" val="1"/>
-              </a:ext>
-            </a:extLst>
-          </p:cNvPr>
-          <p:cNvSpPr>
-            <a:spLocks noGrp="1" noRot="1" noChangeAspect="1" noMove="1" noResize="1" noEditPoints="1" noAdjustHandles="1" noChangeArrowheads="1" noChangeShapeType="1" noTextEdit="1"/>
-          </p:cNvSpPr>
-          <p:nvPr>
-            <p:extLst>
-              <p:ext uri="{386F3935-93C4-4BCD-93E2-E3B085C9AB24}">
-                <p16:designElem xmlns:p16="http://schemas.microsoft.com/office/powerpoint/2015/main" val="1"/>
-              </p:ext>
-            </p:extLst>
-          </p:nvPr>
-        </p:nvSpPr>
-        <p:spPr>
-          <a:xfrm>
-            <a:off x="0" y="0"/>
-            <a:ext cx="7809954" cy="6858000"/>
-          </a:xfrm>
-          <a:custGeom>
-            <a:avLst/>
-            <a:gdLst>
-              <a:gd name="connsiteX0" fmla="*/ 6465239 w 7809954"/>
-              <a:gd name="connsiteY0" fmla="*/ 0 h 6858000"/>
-              <a:gd name="connsiteX1" fmla="*/ 7808777 w 7809954"/>
-              <a:gd name="connsiteY1" fmla="*/ 0 h 6858000"/>
-              <a:gd name="connsiteX2" fmla="*/ 7783732 w 7809954"/>
-              <a:gd name="connsiteY2" fmla="*/ 155676 h 6858000"/>
-              <a:gd name="connsiteX3" fmla="*/ 7759863 w 7809954"/>
-              <a:gd name="connsiteY3" fmla="*/ 310667 h 6858000"/>
-              <a:gd name="connsiteX4" fmla="*/ 7736499 w 7809954"/>
-              <a:gd name="connsiteY4" fmla="*/ 466344 h 6858000"/>
-              <a:gd name="connsiteX5" fmla="*/ 7716496 w 7809954"/>
-              <a:gd name="connsiteY5" fmla="*/ 622706 h 6858000"/>
-              <a:gd name="connsiteX6" fmla="*/ 7696325 w 7809954"/>
-              <a:gd name="connsiteY6" fmla="*/ 778383 h 6858000"/>
-              <a:gd name="connsiteX7" fmla="*/ 7677499 w 7809954"/>
-              <a:gd name="connsiteY7" fmla="*/ 934745 h 6858000"/>
-              <a:gd name="connsiteX8" fmla="*/ 7661363 w 7809954"/>
-              <a:gd name="connsiteY8" fmla="*/ 1089050 h 6858000"/>
-              <a:gd name="connsiteX9" fmla="*/ 7646067 w 7809954"/>
-              <a:gd name="connsiteY9" fmla="*/ 1245413 h 6858000"/>
-              <a:gd name="connsiteX10" fmla="*/ 7632115 w 7809954"/>
-              <a:gd name="connsiteY10" fmla="*/ 1401089 h 6858000"/>
-              <a:gd name="connsiteX11" fmla="*/ 7620013 w 7809954"/>
-              <a:gd name="connsiteY11" fmla="*/ 1554023 h 6858000"/>
-              <a:gd name="connsiteX12" fmla="*/ 7607910 w 7809954"/>
-              <a:gd name="connsiteY12" fmla="*/ 1709013 h 6858000"/>
-              <a:gd name="connsiteX13" fmla="*/ 7597825 w 7809954"/>
-              <a:gd name="connsiteY13" fmla="*/ 1861947 h 6858000"/>
-              <a:gd name="connsiteX14" fmla="*/ 7589925 w 7809954"/>
-              <a:gd name="connsiteY14" fmla="*/ 2014880 h 6858000"/>
-              <a:gd name="connsiteX15" fmla="*/ 7581688 w 7809954"/>
-              <a:gd name="connsiteY15" fmla="*/ 2167128 h 6858000"/>
-              <a:gd name="connsiteX16" fmla="*/ 7574797 w 7809954"/>
-              <a:gd name="connsiteY16" fmla="*/ 2318004 h 6858000"/>
-              <a:gd name="connsiteX17" fmla="*/ 7569922 w 7809954"/>
-              <a:gd name="connsiteY17" fmla="*/ 2467508 h 6858000"/>
-              <a:gd name="connsiteX18" fmla="*/ 7565720 w 7809954"/>
-              <a:gd name="connsiteY18" fmla="*/ 2617013 h 6858000"/>
-              <a:gd name="connsiteX19" fmla="*/ 7561686 w 7809954"/>
-              <a:gd name="connsiteY19" fmla="*/ 2765145 h 6858000"/>
-              <a:gd name="connsiteX20" fmla="*/ 7559837 w 7809954"/>
-              <a:gd name="connsiteY20" fmla="*/ 2911221 h 6858000"/>
-              <a:gd name="connsiteX21" fmla="*/ 7557820 w 7809954"/>
-              <a:gd name="connsiteY21" fmla="*/ 3057296 h 6858000"/>
-              <a:gd name="connsiteX22" fmla="*/ 7556811 w 7809954"/>
-              <a:gd name="connsiteY22" fmla="*/ 3201314 h 6858000"/>
-              <a:gd name="connsiteX23" fmla="*/ 7557820 w 7809954"/>
-              <a:gd name="connsiteY23" fmla="*/ 3343960 h 6858000"/>
-              <a:gd name="connsiteX24" fmla="*/ 7557820 w 7809954"/>
-              <a:gd name="connsiteY24" fmla="*/ 3485235 h 6858000"/>
-              <a:gd name="connsiteX25" fmla="*/ 7559837 w 7809954"/>
-              <a:gd name="connsiteY25" fmla="*/ 3625138 h 6858000"/>
-              <a:gd name="connsiteX26" fmla="*/ 7562862 w 7809954"/>
-              <a:gd name="connsiteY26" fmla="*/ 3762298 h 6858000"/>
-              <a:gd name="connsiteX27" fmla="*/ 7565720 w 7809954"/>
-              <a:gd name="connsiteY27" fmla="*/ 3898087 h 6858000"/>
-              <a:gd name="connsiteX28" fmla="*/ 7568914 w 7809954"/>
-              <a:gd name="connsiteY28" fmla="*/ 4031132 h 6858000"/>
-              <a:gd name="connsiteX29" fmla="*/ 7573788 w 7809954"/>
-              <a:gd name="connsiteY29" fmla="*/ 4163491 h 6858000"/>
-              <a:gd name="connsiteX30" fmla="*/ 7578999 w 7809954"/>
-              <a:gd name="connsiteY30" fmla="*/ 4293793 h 6858000"/>
-              <a:gd name="connsiteX31" fmla="*/ 7583705 w 7809954"/>
-              <a:gd name="connsiteY31" fmla="*/ 4421352 h 6858000"/>
-              <a:gd name="connsiteX32" fmla="*/ 7596985 w 7809954"/>
-              <a:gd name="connsiteY32" fmla="*/ 4670298 h 6858000"/>
-              <a:gd name="connsiteX33" fmla="*/ 7611104 w 7809954"/>
-              <a:gd name="connsiteY33" fmla="*/ 4908956 h 6858000"/>
-              <a:gd name="connsiteX34" fmla="*/ 7625896 w 7809954"/>
-              <a:gd name="connsiteY34" fmla="*/ 5138013 h 6858000"/>
-              <a:gd name="connsiteX35" fmla="*/ 7642201 w 7809954"/>
-              <a:gd name="connsiteY35" fmla="*/ 5354726 h 6858000"/>
-              <a:gd name="connsiteX36" fmla="*/ 7659178 w 7809954"/>
-              <a:gd name="connsiteY36" fmla="*/ 5561838 h 6858000"/>
-              <a:gd name="connsiteX37" fmla="*/ 7677499 w 7809954"/>
-              <a:gd name="connsiteY37" fmla="*/ 5753862 h 6858000"/>
-              <a:gd name="connsiteX38" fmla="*/ 7695485 w 7809954"/>
-              <a:gd name="connsiteY38" fmla="*/ 5934227 h 6858000"/>
-              <a:gd name="connsiteX39" fmla="*/ 7713470 w 7809954"/>
-              <a:gd name="connsiteY39" fmla="*/ 6100191 h 6858000"/>
-              <a:gd name="connsiteX40" fmla="*/ 7730447 w 7809954"/>
-              <a:gd name="connsiteY40" fmla="*/ 6252438 h 6858000"/>
-              <a:gd name="connsiteX41" fmla="*/ 7746584 w 7809954"/>
-              <a:gd name="connsiteY41" fmla="*/ 6387541 h 6858000"/>
-              <a:gd name="connsiteX42" fmla="*/ 7761880 w 7809954"/>
-              <a:gd name="connsiteY42" fmla="*/ 6509613 h 6858000"/>
-              <a:gd name="connsiteX43" fmla="*/ 7774655 w 7809954"/>
-              <a:gd name="connsiteY43" fmla="*/ 6612483 h 6858000"/>
-              <a:gd name="connsiteX44" fmla="*/ 7786757 w 7809954"/>
-              <a:gd name="connsiteY44" fmla="*/ 6698894 h 6858000"/>
-              <a:gd name="connsiteX45" fmla="*/ 7804071 w 7809954"/>
-              <a:gd name="connsiteY45" fmla="*/ 6817538 h 6858000"/>
-              <a:gd name="connsiteX46" fmla="*/ 7809954 w 7809954"/>
-              <a:gd name="connsiteY46" fmla="*/ 6858000 h 6858000"/>
-              <a:gd name="connsiteX47" fmla="*/ 7157124 w 7809954"/>
-              <a:gd name="connsiteY47" fmla="*/ 6858000 h 6858000"/>
-              <a:gd name="connsiteX48" fmla="*/ 7157124 w 7809954"/>
-              <a:gd name="connsiteY48" fmla="*/ 6858000 h 6858000"/>
-              <a:gd name="connsiteX49" fmla="*/ 0 w 7809954"/>
-              <a:gd name="connsiteY49" fmla="*/ 6858000 h 6858000"/>
-              <a:gd name="connsiteX50" fmla="*/ 0 w 7809954"/>
-              <a:gd name="connsiteY50" fmla="*/ 0 h 6858000"/>
-              <a:gd name="connsiteX51" fmla="*/ 6465239 w 7809954"/>
-              <a:gd name="connsiteY51" fmla="*/ 0 h 6858000"/>
-            </a:gdLst>
-            <a:ahLst/>
-            <a:cxnLst>
-              <a:cxn ang="0">
-                <a:pos x="connsiteX0" y="connsiteY0"/>
-              </a:cxn>
-              <a:cxn ang="0">
-                <a:pos x="connsiteX1" y="connsiteY1"/>
-              </a:cxn>
-              <a:cxn ang="0">
-                <a:pos x="connsiteX2" y="connsiteY2"/>
-              </a:cxn>
-              <a:cxn ang="0">
-                <a:pos x="connsiteX3" y="connsiteY3"/>
-              </a:cxn>
-              <a:cxn ang="0">
-                <a:pos x="connsiteX4" y="connsiteY4"/>
-              </a:cxn>
-              <a:cxn ang="0">
-                <a:pos x="connsiteX5" y="connsiteY5"/>
-              </a:cxn>
-              <a:cxn ang="0">
-                <a:pos x="connsiteX6" y="connsiteY6"/>
-              </a:cxn>
-              <a:cxn ang="0">
-                <a:pos x="connsiteX7" y="connsiteY7"/>
-              </a:cxn>
-              <a:cxn ang="0">
-                <a:pos x="connsiteX8" y="connsiteY8"/>
-              </a:cxn>
-              <a:cxn ang="0">
-                <a:pos x="connsiteX9" y="connsiteY9"/>
-              </a:cxn>
-              <a:cxn ang="0">
-                <a:pos x="connsiteX10" y="connsiteY10"/>
-              </a:cxn>
-              <a:cxn ang="0">
-                <a:pos x="connsiteX11" y="connsiteY11"/>
-              </a:cxn>
-              <a:cxn ang="0">
-                <a:pos x="connsiteX12" y="connsiteY12"/>
-              </a:cxn>
-              <a:cxn ang="0">
-                <a:pos x="connsiteX13" y="connsiteY13"/>
-              </a:cxn>
-              <a:cxn ang="0">
-                <a:pos x="connsiteX14" y="connsiteY14"/>
-              </a:cxn>
-              <a:cxn ang="0">
-                <a:pos x="connsiteX15" y="connsiteY15"/>
-              </a:cxn>
-              <a:cxn ang="0">
-                <a:pos x="connsiteX16" y="connsiteY16"/>
-              </a:cxn>
-              <a:cxn ang="0">
-                <a:pos x="connsiteX17" y="connsiteY17"/>
-              </a:cxn>
-              <a:cxn ang="0">
-                <a:pos x="connsiteX18" y="connsiteY18"/>
-              </a:cxn>
-              <a:cxn ang="0">
-                <a:pos x="connsiteX19" y="connsiteY19"/>
-              </a:cxn>
-              <a:cxn ang="0">
-                <a:pos x="connsiteX20" y="connsiteY20"/>
-              </a:cxn>
-              <a:cxn ang="0">
-                <a:pos x="connsiteX21" y="connsiteY21"/>
-              </a:cxn>
-              <a:cxn ang="0">
-                <a:pos x="connsiteX22" y="connsiteY22"/>
-              </a:cxn>
-              <a:cxn ang="0">
-                <a:pos x="connsiteX23" y="connsiteY23"/>
-              </a:cxn>
-              <a:cxn ang="0">
-                <a:pos x="connsiteX24" y="connsiteY24"/>
-              </a:cxn>
-              <a:cxn ang="0">
-                <a:pos x="connsiteX25" y="connsiteY25"/>
-              </a:cxn>
-              <a:cxn ang="0">
-                <a:pos x="connsiteX26" y="connsiteY26"/>
-              </a:cxn>
-              <a:cxn ang="0">
-                <a:pos x="connsiteX27" y="connsiteY27"/>
-              </a:cxn>
-              <a:cxn ang="0">
-                <a:pos x="connsiteX28" y="connsiteY28"/>
-              </a:cxn>
-              <a:cxn ang="0">
-                <a:pos x="connsiteX29" y="connsiteY29"/>
-              </a:cxn>
-              <a:cxn ang="0">
-                <a:pos x="connsiteX30" y="connsiteY30"/>
-              </a:cxn>
-              <a:cxn ang="0">
-                <a:pos x="connsiteX31" y="connsiteY31"/>
-              </a:cxn>
-              <a:cxn ang="0">
-                <a:pos x="connsiteX32" y="connsiteY32"/>
-              </a:cxn>
-              <a:cxn ang="0">
-                <a:pos x="connsiteX33" y="connsiteY33"/>
-              </a:cxn>
-              <a:cxn ang="0">
-                <a:pos x="connsiteX34" y="connsiteY34"/>
-              </a:cxn>
-              <a:cxn ang="0">
-                <a:pos x="connsiteX35" y="connsiteY35"/>
-              </a:cxn>
-              <a:cxn ang="0">
-                <a:pos x="connsiteX36" y="connsiteY36"/>
-              </a:cxn>
-              <a:cxn ang="0">
-                <a:pos x="connsiteX37" y="connsiteY37"/>
-              </a:cxn>
-              <a:cxn ang="0">
-                <a:pos x="connsiteX38" y="connsiteY38"/>
-              </a:cxn>
-              <a:cxn ang="0">
-                <a:pos x="connsiteX39" y="connsiteY39"/>
-              </a:cxn>
-              <a:cxn ang="0">
-                <a:pos x="connsiteX40" y="connsiteY40"/>
-              </a:cxn>
-              <a:cxn ang="0">
-                <a:pos x="connsiteX41" y="connsiteY41"/>
-              </a:cxn>
-              <a:cxn ang="0">
-                <a:pos x="connsiteX42" y="connsiteY42"/>
-              </a:cxn>
-              <a:cxn ang="0">
-                <a:pos x="connsiteX43" y="connsiteY43"/>
-              </a:cxn>
-              <a:cxn ang="0">
-                <a:pos x="connsiteX44" y="connsiteY44"/>
-              </a:cxn>
-              <a:cxn ang="0">
-                <a:pos x="connsiteX45" y="connsiteY45"/>
-              </a:cxn>
-              <a:cxn ang="0">
-                <a:pos x="connsiteX46" y="connsiteY46"/>
-              </a:cxn>
-              <a:cxn ang="0">
-                <a:pos x="connsiteX47" y="connsiteY47"/>
-              </a:cxn>
-              <a:cxn ang="0">
-                <a:pos x="connsiteX48" y="connsiteY48"/>
-              </a:cxn>
-              <a:cxn ang="0">
-                <a:pos x="connsiteX49" y="connsiteY49"/>
-              </a:cxn>
-              <a:cxn ang="0">
-                <a:pos x="connsiteX50" y="connsiteY50"/>
-              </a:cxn>
-              <a:cxn ang="0">
-                <a:pos x="connsiteX51" y="connsiteY51"/>
-              </a:cxn>
-            </a:cxnLst>
-            <a:rect l="l" t="t" r="r" b="b"/>
-            <a:pathLst>
-              <a:path w="7809954" h="6858000">
-                <a:moveTo>
-                  <a:pt x="6465239" y="0"/>
-                </a:moveTo>
-                <a:lnTo>
-                  <a:pt x="7808777" y="0"/>
-                </a:lnTo>
-                <a:lnTo>
-                  <a:pt x="7783732" y="155676"/>
-                </a:lnTo>
-                <a:lnTo>
-                  <a:pt x="7759863" y="310667"/>
-                </a:lnTo>
-                <a:lnTo>
-                  <a:pt x="7736499" y="466344"/>
-                </a:lnTo>
-                <a:lnTo>
-                  <a:pt x="7716496" y="622706"/>
-                </a:lnTo>
-                <a:lnTo>
-                  <a:pt x="7696325" y="778383"/>
-                </a:lnTo>
-                <a:lnTo>
-                  <a:pt x="7677499" y="934745"/>
-                </a:lnTo>
-                <a:lnTo>
-                  <a:pt x="7661363" y="1089050"/>
-                </a:lnTo>
-                <a:lnTo>
-                  <a:pt x="7646067" y="1245413"/>
-                </a:lnTo>
-                <a:lnTo>
-                  <a:pt x="7632115" y="1401089"/>
-                </a:lnTo>
-                <a:lnTo>
-                  <a:pt x="7620013" y="1554023"/>
-                </a:lnTo>
-                <a:lnTo>
-                  <a:pt x="7607910" y="1709013"/>
-                </a:lnTo>
-                <a:lnTo>
-                  <a:pt x="7597825" y="1861947"/>
-                </a:lnTo>
-                <a:lnTo>
-                  <a:pt x="7589925" y="2014880"/>
-                </a:lnTo>
-                <a:lnTo>
-                  <a:pt x="7581688" y="2167128"/>
-                </a:lnTo>
-                <a:lnTo>
-                  <a:pt x="7574797" y="2318004"/>
-                </a:lnTo>
-                <a:lnTo>
-                  <a:pt x="7569922" y="2467508"/>
-                </a:lnTo>
-                <a:lnTo>
-                  <a:pt x="7565720" y="2617013"/>
-                </a:lnTo>
-                <a:lnTo>
-                  <a:pt x="7561686" y="2765145"/>
-                </a:lnTo>
-                <a:lnTo>
-                  <a:pt x="7559837" y="2911221"/>
-                </a:lnTo>
-                <a:lnTo>
-                  <a:pt x="7557820" y="3057296"/>
-                </a:lnTo>
-                <a:lnTo>
-                  <a:pt x="7556811" y="3201314"/>
-                </a:lnTo>
-                <a:lnTo>
-                  <a:pt x="7557820" y="3343960"/>
-                </a:lnTo>
-                <a:lnTo>
-                  <a:pt x="7557820" y="3485235"/>
-                </a:lnTo>
-                <a:lnTo>
-                  <a:pt x="7559837" y="3625138"/>
-                </a:lnTo>
-                <a:lnTo>
-                  <a:pt x="7562862" y="3762298"/>
-                </a:lnTo>
-                <a:lnTo>
-                  <a:pt x="7565720" y="3898087"/>
-                </a:lnTo>
-                <a:lnTo>
-                  <a:pt x="7568914" y="4031132"/>
-                </a:lnTo>
-                <a:lnTo>
-                  <a:pt x="7573788" y="4163491"/>
-                </a:lnTo>
-                <a:lnTo>
-                  <a:pt x="7578999" y="4293793"/>
-                </a:lnTo>
-                <a:lnTo>
-                  <a:pt x="7583705" y="4421352"/>
-                </a:lnTo>
-                <a:lnTo>
-                  <a:pt x="7596985" y="4670298"/>
-                </a:lnTo>
-                <a:lnTo>
-                  <a:pt x="7611104" y="4908956"/>
-                </a:lnTo>
-                <a:lnTo>
-                  <a:pt x="7625896" y="5138013"/>
-                </a:lnTo>
-                <a:lnTo>
-                  <a:pt x="7642201" y="5354726"/>
-                </a:lnTo>
-                <a:lnTo>
-                  <a:pt x="7659178" y="5561838"/>
-                </a:lnTo>
-                <a:lnTo>
-                  <a:pt x="7677499" y="5753862"/>
-                </a:lnTo>
-                <a:lnTo>
-                  <a:pt x="7695485" y="5934227"/>
-                </a:lnTo>
-                <a:lnTo>
-                  <a:pt x="7713470" y="6100191"/>
-                </a:lnTo>
-                <a:lnTo>
-                  <a:pt x="7730447" y="6252438"/>
-                </a:lnTo>
-                <a:lnTo>
-                  <a:pt x="7746584" y="6387541"/>
-                </a:lnTo>
-                <a:lnTo>
-                  <a:pt x="7761880" y="6509613"/>
-                </a:lnTo>
-                <a:lnTo>
-                  <a:pt x="7774655" y="6612483"/>
-                </a:lnTo>
-                <a:lnTo>
-                  <a:pt x="7786757" y="6698894"/>
-                </a:lnTo>
-                <a:lnTo>
-                  <a:pt x="7804071" y="6817538"/>
-                </a:lnTo>
-                <a:lnTo>
-                  <a:pt x="7809954" y="6858000"/>
-                </a:lnTo>
-                <a:lnTo>
-                  <a:pt x="7157124" y="6858000"/>
-                </a:lnTo>
-                <a:lnTo>
-                  <a:pt x="7157124" y="6858000"/>
-                </a:lnTo>
-                <a:lnTo>
-                  <a:pt x="0" y="6858000"/>
-                </a:lnTo>
-                <a:lnTo>
-                  <a:pt x="0" y="0"/>
-                </a:lnTo>
-                <a:lnTo>
-                  <a:pt x="6465239" y="0"/>
-                </a:lnTo>
-                <a:close/>
-              </a:path>
-            </a:pathLst>
-          </a:custGeom>
           <a:ln>
             <a:noFill/>
           </a:ln>
@@ -16747,9 +15972,7 @@
           </a:fontRef>
         </p:style>
         <p:txBody>
-          <a:bodyPr wrap="square" rtlCol="0" anchor="ctr">
-            <a:noAutofit/>
-          </a:bodyPr>
+          <a:bodyPr rtlCol="0" anchor="ctr"/>
           <a:lstStyle/>
           <a:p>
             <a:pPr algn="ctr"/>
@@ -16759,10 +15982,10 @@
       </p:sp>
       <p:sp>
         <p:nvSpPr>
-          <p:cNvPr id="50" name="Rectangle 49">
+          <p:cNvPr id="26" name="Rectangle 25">
             <a:extLst>
               <a:ext uri="{FF2B5EF4-FFF2-40B4-BE49-F238E27FC236}">
-                <a16:creationId xmlns:a16="http://schemas.microsoft.com/office/drawing/2014/main" id="{F98810A7-E114-447A-A7D6-69B27CFB5650}"/>
+                <a16:creationId xmlns:a16="http://schemas.microsoft.com/office/drawing/2014/main" id="{9B06DBD9-DED6-40C2-A7AD-3662707C4145}"/>
               </a:ext>
               <a:ext uri="{C183D7F6-B498-43B3-948B-1728B52AA6E4}">
                 <adec:decorative xmlns:adec="http://schemas.microsoft.com/office/drawing/2017/decorative" val="1"/>
@@ -16810,12 +16033,376 @@
           </a:fontRef>
         </p:style>
       </p:sp>
+      <p:sp>
+        <p:nvSpPr>
+          <p:cNvPr id="28" name="Freeform 15">
+            <a:extLst>
+              <a:ext uri="{FF2B5EF4-FFF2-40B4-BE49-F238E27FC236}">
+                <a16:creationId xmlns:a16="http://schemas.microsoft.com/office/drawing/2014/main" id="{B431FF8B-6FC2-47C1-B2C5-9B26E62436B0}"/>
+              </a:ext>
+              <a:ext uri="{C183D7F6-B498-43B3-948B-1728B52AA6E4}">
+                <adec:decorative xmlns:adec="http://schemas.microsoft.com/office/drawing/2017/decorative" val="1"/>
+              </a:ext>
+            </a:extLst>
+          </p:cNvPr>
+          <p:cNvSpPr>
+            <a:spLocks noGrp="1" noRot="1" noChangeAspect="1" noMove="1" noResize="1" noEditPoints="1" noAdjustHandles="1" noChangeArrowheads="1" noChangeShapeType="1" noTextEdit="1"/>
+          </p:cNvSpPr>
+          <p:nvPr>
+            <p:extLst>
+              <p:ext uri="{386F3935-93C4-4BCD-93E2-E3B085C9AB24}">
+                <p16:designElem xmlns:p16="http://schemas.microsoft.com/office/powerpoint/2015/main" val="1"/>
+              </p:ext>
+            </p:extLst>
+          </p:nvPr>
+        </p:nvSpPr>
+        <p:spPr>
+          <a:xfrm>
+            <a:off x="8719939" y="3753695"/>
+            <a:ext cx="3472060" cy="825932"/>
+          </a:xfrm>
+          <a:custGeom>
+            <a:avLst/>
+            <a:gdLst>
+              <a:gd name="connsiteX0" fmla="*/ 3470310 w 3472060"/>
+              <a:gd name="connsiteY0" fmla="*/ 0 h 825932"/>
+              <a:gd name="connsiteX1" fmla="*/ 3472060 w 3472060"/>
+              <a:gd name="connsiteY1" fmla="*/ 12850 h 825932"/>
+              <a:gd name="connsiteX2" fmla="*/ 3472060 w 3472060"/>
+              <a:gd name="connsiteY2" fmla="*/ 480529 h 825932"/>
+              <a:gd name="connsiteX3" fmla="*/ 3363699 w 3472060"/>
+              <a:gd name="connsiteY3" fmla="*/ 498471 h 825932"/>
+              <a:gd name="connsiteX4" fmla="*/ 42060 w 3472060"/>
+              <a:gd name="connsiteY4" fmla="*/ 824486 h 825932"/>
+              <a:gd name="connsiteX5" fmla="*/ 0 w 3472060"/>
+              <a:gd name="connsiteY5" fmla="*/ 758452 h 825932"/>
+              <a:gd name="connsiteX6" fmla="*/ 188014 w 3472060"/>
+              <a:gd name="connsiteY6" fmla="*/ 735602 h 825932"/>
+              <a:gd name="connsiteX7" fmla="*/ 284087 w 3472060"/>
+              <a:gd name="connsiteY7" fmla="*/ 722590 h 825932"/>
+              <a:gd name="connsiteX8" fmla="*/ 382288 w 3472060"/>
+              <a:gd name="connsiteY8" fmla="*/ 709392 h 825932"/>
+              <a:gd name="connsiteX9" fmla="*/ 481858 w 3472060"/>
+              <a:gd name="connsiteY9" fmla="*/ 695774 h 825932"/>
+              <a:gd name="connsiteX10" fmla="*/ 581897 w 3472060"/>
+              <a:gd name="connsiteY10" fmla="*/ 680711 h 825932"/>
+              <a:gd name="connsiteX11" fmla="*/ 683670 w 3472060"/>
+              <a:gd name="connsiteY11" fmla="*/ 665256 h 825932"/>
+              <a:gd name="connsiteX12" fmla="*/ 787206 w 3472060"/>
+              <a:gd name="connsiteY12" fmla="*/ 649587 h 825932"/>
+              <a:gd name="connsiteX13" fmla="*/ 892019 w 3472060"/>
+              <a:gd name="connsiteY13" fmla="*/ 632968 h 825932"/>
+              <a:gd name="connsiteX14" fmla="*/ 997620 w 3472060"/>
+              <a:gd name="connsiteY14" fmla="*/ 614667 h 825932"/>
+              <a:gd name="connsiteX15" fmla="*/ 1104727 w 3472060"/>
+              <a:gd name="connsiteY15" fmla="*/ 596741 h 825932"/>
+              <a:gd name="connsiteX16" fmla="*/ 1212669 w 3472060"/>
+              <a:gd name="connsiteY16" fmla="*/ 577397 h 825932"/>
+              <a:gd name="connsiteX17" fmla="*/ 1321506 w 3472060"/>
+              <a:gd name="connsiteY17" fmla="*/ 556988 h 825932"/>
+              <a:gd name="connsiteX18" fmla="*/ 1430709 w 3472060"/>
+              <a:gd name="connsiteY18" fmla="*/ 536607 h 825932"/>
+              <a:gd name="connsiteX19" fmla="*/ 1541050 w 3472060"/>
+              <a:gd name="connsiteY19" fmla="*/ 514481 h 825932"/>
+              <a:gd name="connsiteX20" fmla="*/ 1652805 w 3472060"/>
+              <a:gd name="connsiteY20" fmla="*/ 492202 h 825932"/>
+              <a:gd name="connsiteX21" fmla="*/ 1763708 w 3472060"/>
+              <a:gd name="connsiteY21" fmla="*/ 469161 h 825932"/>
+              <a:gd name="connsiteX22" fmla="*/ 1875795 w 3472060"/>
+              <a:gd name="connsiteY22" fmla="*/ 444641 h 825932"/>
+              <a:gd name="connsiteX23" fmla="*/ 1989128 w 3472060"/>
+              <a:gd name="connsiteY23" fmla="*/ 418995 h 825932"/>
+              <a:gd name="connsiteX24" fmla="*/ 2102476 w 3472060"/>
+              <a:gd name="connsiteY24" fmla="*/ 393438 h 825932"/>
+              <a:gd name="connsiteX25" fmla="*/ 2215549 w 3472060"/>
+              <a:gd name="connsiteY25" fmla="*/ 366291 h 825932"/>
+              <a:gd name="connsiteX26" fmla="*/ 2330490 w 3472060"/>
+              <a:gd name="connsiteY26" fmla="*/ 337455 h 825932"/>
+              <a:gd name="connsiteX27" fmla="*/ 2443333 w 3472060"/>
+              <a:gd name="connsiteY27" fmla="*/ 308983 h 825932"/>
+              <a:gd name="connsiteX28" fmla="*/ 2558014 w 3472060"/>
+              <a:gd name="connsiteY28" fmla="*/ 278646 h 825932"/>
+              <a:gd name="connsiteX29" fmla="*/ 2673621 w 3472060"/>
+              <a:gd name="connsiteY29" fmla="*/ 247421 h 825932"/>
+              <a:gd name="connsiteX30" fmla="*/ 2787008 w 3472060"/>
+              <a:gd name="connsiteY30" fmla="*/ 215853 h 825932"/>
+              <a:gd name="connsiteX31" fmla="*/ 2901442 w 3472060"/>
+              <a:gd name="connsiteY31" fmla="*/ 182011 h 825932"/>
+              <a:gd name="connsiteX32" fmla="*/ 3015722 w 3472060"/>
+              <a:gd name="connsiteY32" fmla="*/ 147286 h 825932"/>
+              <a:gd name="connsiteX33" fmla="*/ 3130018 w 3472060"/>
+              <a:gd name="connsiteY33" fmla="*/ 112649 h 825932"/>
+              <a:gd name="connsiteX34" fmla="*/ 3243551 w 3472060"/>
+              <a:gd name="connsiteY34" fmla="*/ 75688 h 825932"/>
+              <a:gd name="connsiteX35" fmla="*/ 3356992 w 3472060"/>
+              <a:gd name="connsiteY35" fmla="*/ 38197 h 825932"/>
+              <a:gd name="connsiteX36" fmla="*/ 3470310 w 3472060"/>
+              <a:gd name="connsiteY36" fmla="*/ 0 h 825932"/>
+            </a:gdLst>
+            <a:ahLst/>
+            <a:cxnLst>
+              <a:cxn ang="0">
+                <a:pos x="connsiteX0" y="connsiteY0"/>
+              </a:cxn>
+              <a:cxn ang="0">
+                <a:pos x="connsiteX1" y="connsiteY1"/>
+              </a:cxn>
+              <a:cxn ang="0">
+                <a:pos x="connsiteX2" y="connsiteY2"/>
+              </a:cxn>
+              <a:cxn ang="0">
+                <a:pos x="connsiteX3" y="connsiteY3"/>
+              </a:cxn>
+              <a:cxn ang="0">
+                <a:pos x="connsiteX4" y="connsiteY4"/>
+              </a:cxn>
+              <a:cxn ang="0">
+                <a:pos x="connsiteX5" y="connsiteY5"/>
+              </a:cxn>
+              <a:cxn ang="0">
+                <a:pos x="connsiteX6" y="connsiteY6"/>
+              </a:cxn>
+              <a:cxn ang="0">
+                <a:pos x="connsiteX7" y="connsiteY7"/>
+              </a:cxn>
+              <a:cxn ang="0">
+                <a:pos x="connsiteX8" y="connsiteY8"/>
+              </a:cxn>
+              <a:cxn ang="0">
+                <a:pos x="connsiteX9" y="connsiteY9"/>
+              </a:cxn>
+              <a:cxn ang="0">
+                <a:pos x="connsiteX10" y="connsiteY10"/>
+              </a:cxn>
+              <a:cxn ang="0">
+                <a:pos x="connsiteX11" y="connsiteY11"/>
+              </a:cxn>
+              <a:cxn ang="0">
+                <a:pos x="connsiteX12" y="connsiteY12"/>
+              </a:cxn>
+              <a:cxn ang="0">
+                <a:pos x="connsiteX13" y="connsiteY13"/>
+              </a:cxn>
+              <a:cxn ang="0">
+                <a:pos x="connsiteX14" y="connsiteY14"/>
+              </a:cxn>
+              <a:cxn ang="0">
+                <a:pos x="connsiteX15" y="connsiteY15"/>
+              </a:cxn>
+              <a:cxn ang="0">
+                <a:pos x="connsiteX16" y="connsiteY16"/>
+              </a:cxn>
+              <a:cxn ang="0">
+                <a:pos x="connsiteX17" y="connsiteY17"/>
+              </a:cxn>
+              <a:cxn ang="0">
+                <a:pos x="connsiteX18" y="connsiteY18"/>
+              </a:cxn>
+              <a:cxn ang="0">
+                <a:pos x="connsiteX19" y="connsiteY19"/>
+              </a:cxn>
+              <a:cxn ang="0">
+                <a:pos x="connsiteX20" y="connsiteY20"/>
+              </a:cxn>
+              <a:cxn ang="0">
+                <a:pos x="connsiteX21" y="connsiteY21"/>
+              </a:cxn>
+              <a:cxn ang="0">
+                <a:pos x="connsiteX22" y="connsiteY22"/>
+              </a:cxn>
+              <a:cxn ang="0">
+                <a:pos x="connsiteX23" y="connsiteY23"/>
+              </a:cxn>
+              <a:cxn ang="0">
+                <a:pos x="connsiteX24" y="connsiteY24"/>
+              </a:cxn>
+              <a:cxn ang="0">
+                <a:pos x="connsiteX25" y="connsiteY25"/>
+              </a:cxn>
+              <a:cxn ang="0">
+                <a:pos x="connsiteX26" y="connsiteY26"/>
+              </a:cxn>
+              <a:cxn ang="0">
+                <a:pos x="connsiteX27" y="connsiteY27"/>
+              </a:cxn>
+              <a:cxn ang="0">
+                <a:pos x="connsiteX28" y="connsiteY28"/>
+              </a:cxn>
+              <a:cxn ang="0">
+                <a:pos x="connsiteX29" y="connsiteY29"/>
+              </a:cxn>
+              <a:cxn ang="0">
+                <a:pos x="connsiteX30" y="connsiteY30"/>
+              </a:cxn>
+              <a:cxn ang="0">
+                <a:pos x="connsiteX31" y="connsiteY31"/>
+              </a:cxn>
+              <a:cxn ang="0">
+                <a:pos x="connsiteX32" y="connsiteY32"/>
+              </a:cxn>
+              <a:cxn ang="0">
+                <a:pos x="connsiteX33" y="connsiteY33"/>
+              </a:cxn>
+              <a:cxn ang="0">
+                <a:pos x="connsiteX34" y="connsiteY34"/>
+              </a:cxn>
+              <a:cxn ang="0">
+                <a:pos x="connsiteX35" y="connsiteY35"/>
+              </a:cxn>
+              <a:cxn ang="0">
+                <a:pos x="connsiteX36" y="connsiteY36"/>
+              </a:cxn>
+            </a:cxnLst>
+            <a:rect l="l" t="t" r="r" b="b"/>
+            <a:pathLst>
+              <a:path w="3472060" h="825932">
+                <a:moveTo>
+                  <a:pt x="3470310" y="0"/>
+                </a:moveTo>
+                <a:lnTo>
+                  <a:pt x="3472060" y="12850"/>
+                </a:lnTo>
+                <a:lnTo>
+                  <a:pt x="3472060" y="480529"/>
+                </a:lnTo>
+                <a:lnTo>
+                  <a:pt x="3363699" y="498471"/>
+                </a:lnTo>
+                <a:cubicBezTo>
+                  <a:pt x="2435623" y="645518"/>
+                  <a:pt x="603076" y="844866"/>
+                  <a:pt x="42060" y="824486"/>
+                </a:cubicBezTo>
+                <a:cubicBezTo>
+                  <a:pt x="28151" y="802425"/>
+                  <a:pt x="13909" y="780513"/>
+                  <a:pt x="0" y="758452"/>
+                </a:cubicBezTo>
+                <a:lnTo>
+                  <a:pt x="188014" y="735602"/>
+                </a:lnTo>
+                <a:lnTo>
+                  <a:pt x="284087" y="722590"/>
+                </a:lnTo>
+                <a:lnTo>
+                  <a:pt x="382288" y="709392"/>
+                </a:lnTo>
+                <a:lnTo>
+                  <a:pt x="481858" y="695774"/>
+                </a:lnTo>
+                <a:lnTo>
+                  <a:pt x="581897" y="680711"/>
+                </a:lnTo>
+                <a:lnTo>
+                  <a:pt x="683670" y="665256"/>
+                </a:lnTo>
+                <a:lnTo>
+                  <a:pt x="787206" y="649587"/>
+                </a:lnTo>
+                <a:lnTo>
+                  <a:pt x="892019" y="632968"/>
+                </a:lnTo>
+                <a:lnTo>
+                  <a:pt x="997620" y="614667"/>
+                </a:lnTo>
+                <a:lnTo>
+                  <a:pt x="1104727" y="596741"/>
+                </a:lnTo>
+                <a:lnTo>
+                  <a:pt x="1212669" y="577397"/>
+                </a:lnTo>
+                <a:lnTo>
+                  <a:pt x="1321506" y="556988"/>
+                </a:lnTo>
+                <a:lnTo>
+                  <a:pt x="1430709" y="536607"/>
+                </a:lnTo>
+                <a:lnTo>
+                  <a:pt x="1541050" y="514481"/>
+                </a:lnTo>
+                <a:lnTo>
+                  <a:pt x="1652805" y="492202"/>
+                </a:lnTo>
+                <a:lnTo>
+                  <a:pt x="1763708" y="469161"/>
+                </a:lnTo>
+                <a:lnTo>
+                  <a:pt x="1875795" y="444641"/>
+                </a:lnTo>
+                <a:lnTo>
+                  <a:pt x="1989128" y="418995"/>
+                </a:lnTo>
+                <a:lnTo>
+                  <a:pt x="2102476" y="393438"/>
+                </a:lnTo>
+                <a:lnTo>
+                  <a:pt x="2215549" y="366291"/>
+                </a:lnTo>
+                <a:lnTo>
+                  <a:pt x="2330490" y="337455"/>
+                </a:lnTo>
+                <a:lnTo>
+                  <a:pt x="2443333" y="308983"/>
+                </a:lnTo>
+                <a:lnTo>
+                  <a:pt x="2558014" y="278646"/>
+                </a:lnTo>
+                <a:lnTo>
+                  <a:pt x="2673621" y="247421"/>
+                </a:lnTo>
+                <a:lnTo>
+                  <a:pt x="2787008" y="215853"/>
+                </a:lnTo>
+                <a:lnTo>
+                  <a:pt x="2901442" y="182011"/>
+                </a:lnTo>
+                <a:lnTo>
+                  <a:pt x="3015722" y="147286"/>
+                </a:lnTo>
+                <a:lnTo>
+                  <a:pt x="3130018" y="112649"/>
+                </a:lnTo>
+                <a:lnTo>
+                  <a:pt x="3243551" y="75688"/>
+                </a:lnTo>
+                <a:lnTo>
+                  <a:pt x="3356992" y="38197"/>
+                </a:lnTo>
+                <a:lnTo>
+                  <a:pt x="3470310" y="0"/>
+                </a:lnTo>
+                <a:close/>
+              </a:path>
+            </a:pathLst>
+          </a:custGeom>
+          <a:solidFill>
+            <a:schemeClr val="bg2">
+              <a:alpha val="20000"/>
+            </a:schemeClr>
+          </a:solidFill>
+          <a:ln>
+            <a:noFill/>
+          </a:ln>
+        </p:spPr>
+        <p:txBody>
+          <a:bodyPr rtlCol="0" anchor="ctr"/>
+          <a:lstStyle/>
+          <a:p>
+            <a:pPr algn="ctr"/>
+            <a:endParaRPr lang="en-US">
+              <a:solidFill>
+                <a:schemeClr val="tx1"/>
+              </a:solidFill>
+            </a:endParaRPr>
+          </a:p>
+        </p:txBody>
+      </p:sp>
       <p:pic>
         <p:nvPicPr>
-          <p:cNvPr id="6" name="Content Placeholder 5" descr="A screenshot of a cell phone&#10;&#10;Description automatically generated">
+          <p:cNvPr id="7" name="Content Placeholder 5" descr="A screenshot of a cell phone&#10;&#10;Description automatically generated">
             <a:extLst>
               <a:ext uri="{FF2B5EF4-FFF2-40B4-BE49-F238E27FC236}">
-                <a16:creationId xmlns:a16="http://schemas.microsoft.com/office/drawing/2014/main" id="{0483817A-7949-4D68-8D6D-0085DCC86BAC}"/>
+                <a16:creationId xmlns:a16="http://schemas.microsoft.com/office/drawing/2014/main" id="{3508A1EB-39ED-4697-8478-6BBA6BAFF4F0}"/>
               </a:ext>
             </a:extLst>
           </p:cNvPr>
@@ -16839,8 +16426,280 @@
         </p:blipFill>
         <p:spPr>
           <a:xfrm>
-            <a:off x="643854" y="1071448"/>
-            <a:ext cx="6270662" cy="4714638"/>
+            <a:off x="5290498" y="636083"/>
+            <a:ext cx="4378286" cy="3291844"/>
+          </a:xfrm>
+          <a:prstGeom prst="rect">
+            <a:avLst/>
+          </a:prstGeom>
+          <a:effectLst/>
+        </p:spPr>
+      </p:pic>
+      <p:sp useBgFill="1">
+        <p:nvSpPr>
+          <p:cNvPr id="30" name="Freeform 5">
+            <a:extLst>
+              <a:ext uri="{FF2B5EF4-FFF2-40B4-BE49-F238E27FC236}">
+                <a16:creationId xmlns:a16="http://schemas.microsoft.com/office/drawing/2014/main" id="{4BA7EBCC-256E-4075-A58C-6ED2BFD5C99E}"/>
+              </a:ext>
+              <a:ext uri="{C183D7F6-B498-43B3-948B-1728B52AA6E4}">
+                <adec:decorative xmlns:adec="http://schemas.microsoft.com/office/drawing/2017/decorative" val="1"/>
+              </a:ext>
+            </a:extLst>
+          </p:cNvPr>
+          <p:cNvSpPr>
+            <a:spLocks noGrp="1" noRot="1" noChangeAspect="1" noMove="1" noResize="1" noEditPoints="1" noAdjustHandles="1" noChangeArrowheads="1" noChangeShapeType="1" noTextEdit="1"/>
+          </p:cNvSpPr>
+          <p:nvPr>
+            <p:extLst>
+              <p:ext uri="{386F3935-93C4-4BCD-93E2-E3B085C9AB24}">
+                <p16:designElem xmlns:p16="http://schemas.microsoft.com/office/powerpoint/2015/main" val="1"/>
+              </p:ext>
+            </p:extLst>
+          </p:nvPr>
+        </p:nvSpPr>
+        <p:spPr bwMode="gray">
+          <a:xfrm>
+            <a:off x="1" y="4055532"/>
+            <a:ext cx="12191695" cy="2802467"/>
+          </a:xfrm>
+          <a:custGeom>
+            <a:avLst/>
+            <a:gdLst/>
+            <a:ahLst/>
+            <a:cxnLst/>
+            <a:rect l="l" t="t" r="r" b="b"/>
+            <a:pathLst>
+              <a:path w="10000" h="8000">
+                <a:moveTo>
+                  <a:pt x="0" y="0"/>
+                </a:moveTo>
+                <a:lnTo>
+                  <a:pt x="0" y="7970"/>
+                </a:lnTo>
+                <a:lnTo>
+                  <a:pt x="10000" y="8000"/>
+                </a:lnTo>
+                <a:lnTo>
+                  <a:pt x="10000" y="7"/>
+                </a:lnTo>
+                <a:lnTo>
+                  <a:pt x="10000" y="7"/>
+                </a:lnTo>
+                <a:lnTo>
+                  <a:pt x="9773" y="156"/>
+                </a:lnTo>
+                <a:lnTo>
+                  <a:pt x="9547" y="298"/>
+                </a:lnTo>
+                <a:lnTo>
+                  <a:pt x="9320" y="437"/>
+                </a:lnTo>
+                <a:lnTo>
+                  <a:pt x="9092" y="556"/>
+                </a:lnTo>
+                <a:lnTo>
+                  <a:pt x="8865" y="676"/>
+                </a:lnTo>
+                <a:lnTo>
+                  <a:pt x="8637" y="788"/>
+                </a:lnTo>
+                <a:lnTo>
+                  <a:pt x="8412" y="884"/>
+                </a:lnTo>
+                <a:lnTo>
+                  <a:pt x="8184" y="975"/>
+                </a:lnTo>
+                <a:lnTo>
+                  <a:pt x="7957" y="1058"/>
+                </a:lnTo>
+                <a:lnTo>
+                  <a:pt x="7734" y="1130"/>
+                </a:lnTo>
+                <a:lnTo>
+                  <a:pt x="7508" y="1202"/>
+                </a:lnTo>
+                <a:lnTo>
+                  <a:pt x="7285" y="1262"/>
+                </a:lnTo>
+                <a:lnTo>
+                  <a:pt x="7062" y="1309"/>
+                </a:lnTo>
+                <a:lnTo>
+                  <a:pt x="6840" y="1358"/>
+                </a:lnTo>
+                <a:lnTo>
+                  <a:pt x="6620" y="1399"/>
+                </a:lnTo>
+                <a:lnTo>
+                  <a:pt x="6402" y="1428"/>
+                </a:lnTo>
+                <a:lnTo>
+                  <a:pt x="6184" y="1453"/>
+                </a:lnTo>
+                <a:lnTo>
+                  <a:pt x="5968" y="1477"/>
+                </a:lnTo>
+                <a:lnTo>
+                  <a:pt x="5755" y="1488"/>
+                </a:lnTo>
+                <a:lnTo>
+                  <a:pt x="5542" y="1500"/>
+                </a:lnTo>
+                <a:lnTo>
+                  <a:pt x="5332" y="1506"/>
+                </a:lnTo>
+                <a:lnTo>
+                  <a:pt x="5124" y="1500"/>
+                </a:lnTo>
+                <a:lnTo>
+                  <a:pt x="4918" y="1500"/>
+                </a:lnTo>
+                <a:lnTo>
+                  <a:pt x="4714" y="1488"/>
+                </a:lnTo>
+                <a:lnTo>
+                  <a:pt x="4514" y="1470"/>
+                </a:lnTo>
+                <a:lnTo>
+                  <a:pt x="4316" y="1453"/>
+                </a:lnTo>
+                <a:lnTo>
+                  <a:pt x="4122" y="1434"/>
+                </a:lnTo>
+                <a:lnTo>
+                  <a:pt x="3929" y="1405"/>
+                </a:lnTo>
+                <a:lnTo>
+                  <a:pt x="3739" y="1374"/>
+                </a:lnTo>
+                <a:lnTo>
+                  <a:pt x="3553" y="1346"/>
+                </a:lnTo>
+                <a:lnTo>
+                  <a:pt x="3190" y="1267"/>
+                </a:lnTo>
+                <a:lnTo>
+                  <a:pt x="2842" y="1183"/>
+                </a:lnTo>
+                <a:lnTo>
+                  <a:pt x="2508" y="1095"/>
+                </a:lnTo>
+                <a:lnTo>
+                  <a:pt x="2192" y="998"/>
+                </a:lnTo>
+                <a:lnTo>
+                  <a:pt x="1890" y="897"/>
+                </a:lnTo>
+                <a:lnTo>
+                  <a:pt x="1610" y="788"/>
+                </a:lnTo>
+                <a:lnTo>
+                  <a:pt x="1347" y="681"/>
+                </a:lnTo>
+                <a:lnTo>
+                  <a:pt x="1105" y="574"/>
+                </a:lnTo>
+                <a:lnTo>
+                  <a:pt x="883" y="473"/>
+                </a:lnTo>
+                <a:lnTo>
+                  <a:pt x="686" y="377"/>
+                </a:lnTo>
+                <a:lnTo>
+                  <a:pt x="508" y="286"/>
+                </a:lnTo>
+                <a:lnTo>
+                  <a:pt x="358" y="210"/>
+                </a:lnTo>
+                <a:lnTo>
+                  <a:pt x="232" y="138"/>
+                </a:lnTo>
+                <a:lnTo>
+                  <a:pt x="59" y="35"/>
+                </a:lnTo>
+                <a:lnTo>
+                  <a:pt x="0" y="0"/>
+                </a:lnTo>
+                <a:lnTo>
+                  <a:pt x="0" y="0"/>
+                </a:lnTo>
+                <a:close/>
+              </a:path>
+            </a:pathLst>
+          </a:custGeom>
+          <a:ln>
+            <a:noFill/>
+          </a:ln>
+        </p:spPr>
+      </p:sp>
+      <p:sp>
+        <p:nvSpPr>
+          <p:cNvPr id="2" name="Title 1">
+            <a:extLst>
+              <a:ext uri="{FF2B5EF4-FFF2-40B4-BE49-F238E27FC236}">
+                <a16:creationId xmlns:a16="http://schemas.microsoft.com/office/drawing/2014/main" id="{CCC9FFEB-E389-4C82-820C-AF3F8032168F}"/>
+              </a:ext>
+            </a:extLst>
+          </p:cNvPr>
+          <p:cNvSpPr>
+            <a:spLocks noGrp="1"/>
+          </p:cNvSpPr>
+          <p:nvPr>
+            <p:ph type="title"/>
+          </p:nvPr>
+        </p:nvSpPr>
+        <p:spPr>
+          <a:xfrm>
+            <a:off x="635458" y="4854344"/>
+            <a:ext cx="9345155" cy="861802"/>
+          </a:xfrm>
+        </p:spPr>
+        <p:txBody>
+          <a:bodyPr vert="horz" lIns="91440" tIns="45720" rIns="91440" bIns="45720" rtlCol="0" anchor="b">
+            <a:normAutofit/>
+          </a:bodyPr>
+          <a:lstStyle/>
+          <a:p>
+            <a:r>
+              <a:rPr lang="en-US" sz="4800"/>
+              <a:t>Balsamiq Wireframes</a:t>
+            </a:r>
+          </a:p>
+        </p:txBody>
+      </p:sp>
+      <p:pic>
+        <p:nvPicPr>
+          <p:cNvPr id="6" name="Content Placeholder 5" descr="A screenshot of a cell phone&#10;&#10;Description automatically generated">
+            <a:extLst>
+              <a:ext uri="{FF2B5EF4-FFF2-40B4-BE49-F238E27FC236}">
+                <a16:creationId xmlns:a16="http://schemas.microsoft.com/office/drawing/2014/main" id="{DC0AE682-83B1-40AA-80A5-B84FAAFBB710}"/>
+              </a:ext>
+            </a:extLst>
+          </p:cNvPr>
+          <p:cNvPicPr>
+            <a:picLocks noGrp="1" noChangeAspect="1"/>
+          </p:cNvPicPr>
+          <p:nvPr>
+            <p:ph sz="half" idx="1"/>
+          </p:nvPr>
+        </p:nvPicPr>
+        <p:blipFill>
+          <a:blip r:embed="rId8">
+            <a:extLst>
+              <a:ext uri="{28A0092B-C50C-407E-A947-70E740481C1C}">
+                <a14:useLocalDpi xmlns:a14="http://schemas.microsoft.com/office/drawing/2010/main" val="0"/>
+              </a:ext>
+            </a:extLst>
+          </a:blip>
+          <a:stretch>
+            <a:fillRect/>
+          </a:stretch>
+        </p:blipFill>
+        <p:spPr>
+          <a:xfrm>
+            <a:off x="643855" y="636083"/>
+            <a:ext cx="3698701" cy="3291844"/>
           </a:xfrm>
           <a:prstGeom prst="rect">
             <a:avLst/>
@@ -16851,12 +16710,12 @@
     </p:spTree>
     <p:extLst>
       <p:ext uri="{BB962C8B-B14F-4D97-AF65-F5344CB8AC3E}">
-        <p14:creationId xmlns:p14="http://schemas.microsoft.com/office/powerpoint/2010/main" val="373770894"/>
+        <p14:creationId xmlns:p14="http://schemas.microsoft.com/office/powerpoint/2010/main" val="3385100242"/>
       </p:ext>
     </p:extLst>
   </p:cSld>
   <p:clrMapOvr>
-    <a:overrideClrMapping bg1="lt1" tx1="dk1" bg2="lt2" tx2="dk2" accent1="accent1" accent2="accent2" accent3="accent3" accent4="accent4" accent5="accent5" accent6="accent6" hlink="hlink" folHlink="folHlink"/>
+    <a:masterClrMapping/>
   </p:clrMapOvr>
 </p:sld>
 </file>
@@ -22650,7 +22509,7 @@
     <p:bg>
       <p:bgPr>
         <a:blipFill rotWithShape="1">
-          <a:blip r:embed="rId2">
+          <a:blip r:embed="rId3">
             <a:duotone>
               <a:schemeClr val="bg2">
                 <a:shade val="69000"/>
@@ -22709,7 +22568,7 @@
           </p:nvPr>
         </p:nvPicPr>
         <p:blipFill rotWithShape="1">
-          <a:blip r:embed="rId3">
+          <a:blip r:embed="rId4">
             <a:extLst>
               <a:ext uri="{28A0092B-C50C-407E-A947-70E740481C1C}">
                 <a14:useLocalDpi xmlns:a14="http://schemas.microsoft.com/office/drawing/2010/main" val="0"/>
@@ -22753,7 +22612,7 @@
           </p:nvPr>
         </p:nvPicPr>
         <p:blipFill rotWithShape="1">
-          <a:blip r:embed="rId4">
+          <a:blip r:embed="rId5">
             <a:extLst>
               <a:ext uri="{28A0092B-C50C-407E-A947-70E740481C1C}">
                 <a14:useLocalDpi xmlns:a14="http://schemas.microsoft.com/office/drawing/2010/main" val="0"/>
@@ -22877,7 +22736,7 @@
           </p:nvPr>
         </p:nvPicPr>
         <p:blipFill rotWithShape="1">
-          <a:blip r:embed="rId5">
+          <a:blip r:embed="rId6">
             <a:extLst>
               <a:ext uri="{28A0092B-C50C-407E-A947-70E740481C1C}">
                 <a14:useLocalDpi xmlns:a14="http://schemas.microsoft.com/office/drawing/2010/main" val="0"/>
@@ -22921,7 +22780,7 @@
           </p:nvPr>
         </p:nvPicPr>
         <p:blipFill rotWithShape="1">
-          <a:blip r:embed="rId6">
+          <a:blip r:embed="rId7">
             <a:extLst>
               <a:ext uri="{28A0092B-C50C-407E-A947-70E740481C1C}">
                 <a14:useLocalDpi xmlns:a14="http://schemas.microsoft.com/office/drawing/2010/main" val="0"/>

</xml_diff>